<commit_message>
Plànol i Temps d'espera
Plànol i Temps d'espera
</commit_message>
<xml_diff>
--- a/Documentació/Disseny linies RENFE.pptx
+++ b/Documentació/Disseny linies RENFE.pptx
@@ -6,6 +6,9 @@
   </p:sldMasterIdLst>
   <p:sldIdLst>
     <p:sldId id="256" r:id="rId2"/>
+    <p:sldId id="257" r:id="rId3"/>
+    <p:sldId id="259" r:id="rId4"/>
+    <p:sldId id="260" r:id="rId5"/>
   </p:sldIdLst>
   <p:sldSz cx="12192000" cy="6858000"/>
   <p:notesSz cx="6858000" cy="9144000"/>
@@ -104,6 +107,11 @@
       </a:defRPr>
     </a:lvl9pPr>
   </p:defaultTextStyle>
+  <p:extLst>
+    <p:ext uri="{EFAFB233-063F-42B5-8137-9DF3F51BA10A}">
+      <p15:sldGuideLst xmlns:p15="http://schemas.microsoft.com/office/powerpoint/2012/main"/>
+    </p:ext>
+  </p:extLst>
 </p:presentation>
 </file>
 
@@ -254,7 +262,7 @@
           <a:p>
             <a:fld id="{3A1CB431-3844-4568-A591-C223097C649E}" type="datetimeFigureOut">
               <a:rPr lang="es-ES" smtClean="0"/>
-              <a:t>18/09/2021</a:t>
+              <a:t>16/11/2021</a:t>
             </a:fld>
             <a:endParaRPr lang="es-ES"/>
           </a:p>
@@ -452,7 +460,7 @@
           <a:p>
             <a:fld id="{3A1CB431-3844-4568-A591-C223097C649E}" type="datetimeFigureOut">
               <a:rPr lang="es-ES" smtClean="0"/>
-              <a:t>18/09/2021</a:t>
+              <a:t>16/11/2021</a:t>
             </a:fld>
             <a:endParaRPr lang="es-ES"/>
           </a:p>
@@ -660,7 +668,7 @@
           <a:p>
             <a:fld id="{3A1CB431-3844-4568-A591-C223097C649E}" type="datetimeFigureOut">
               <a:rPr lang="es-ES" smtClean="0"/>
-              <a:t>18/09/2021</a:t>
+              <a:t>16/11/2021</a:t>
             </a:fld>
             <a:endParaRPr lang="es-ES"/>
           </a:p>
@@ -858,7 +866,7 @@
           <a:p>
             <a:fld id="{3A1CB431-3844-4568-A591-C223097C649E}" type="datetimeFigureOut">
               <a:rPr lang="es-ES" smtClean="0"/>
-              <a:t>18/09/2021</a:t>
+              <a:t>16/11/2021</a:t>
             </a:fld>
             <a:endParaRPr lang="es-ES"/>
           </a:p>
@@ -1133,7 +1141,7 @@
           <a:p>
             <a:fld id="{3A1CB431-3844-4568-A591-C223097C649E}" type="datetimeFigureOut">
               <a:rPr lang="es-ES" smtClean="0"/>
-              <a:t>18/09/2021</a:t>
+              <a:t>16/11/2021</a:t>
             </a:fld>
             <a:endParaRPr lang="es-ES"/>
           </a:p>
@@ -1398,7 +1406,7 @@
           <a:p>
             <a:fld id="{3A1CB431-3844-4568-A591-C223097C649E}" type="datetimeFigureOut">
               <a:rPr lang="es-ES" smtClean="0"/>
-              <a:t>18/09/2021</a:t>
+              <a:t>16/11/2021</a:t>
             </a:fld>
             <a:endParaRPr lang="es-ES"/>
           </a:p>
@@ -1810,7 +1818,7 @@
           <a:p>
             <a:fld id="{3A1CB431-3844-4568-A591-C223097C649E}" type="datetimeFigureOut">
               <a:rPr lang="es-ES" smtClean="0"/>
-              <a:t>18/09/2021</a:t>
+              <a:t>16/11/2021</a:t>
             </a:fld>
             <a:endParaRPr lang="es-ES"/>
           </a:p>
@@ -1951,7 +1959,7 @@
           <a:p>
             <a:fld id="{3A1CB431-3844-4568-A591-C223097C649E}" type="datetimeFigureOut">
               <a:rPr lang="es-ES" smtClean="0"/>
-              <a:t>18/09/2021</a:t>
+              <a:t>16/11/2021</a:t>
             </a:fld>
             <a:endParaRPr lang="es-ES"/>
           </a:p>
@@ -2064,7 +2072,7 @@
           <a:p>
             <a:fld id="{3A1CB431-3844-4568-A591-C223097C649E}" type="datetimeFigureOut">
               <a:rPr lang="es-ES" smtClean="0"/>
-              <a:t>18/09/2021</a:t>
+              <a:t>16/11/2021</a:t>
             </a:fld>
             <a:endParaRPr lang="es-ES"/>
           </a:p>
@@ -2375,7 +2383,7 @@
           <a:p>
             <a:fld id="{3A1CB431-3844-4568-A591-C223097C649E}" type="datetimeFigureOut">
               <a:rPr lang="es-ES" smtClean="0"/>
-              <a:t>18/09/2021</a:t>
+              <a:t>16/11/2021</a:t>
             </a:fld>
             <a:endParaRPr lang="es-ES"/>
           </a:p>
@@ -2663,7 +2671,7 @@
           <a:p>
             <a:fld id="{3A1CB431-3844-4568-A591-C223097C649E}" type="datetimeFigureOut">
               <a:rPr lang="es-ES" smtClean="0"/>
-              <a:t>18/09/2021</a:t>
+              <a:t>16/11/2021</a:t>
             </a:fld>
             <a:endParaRPr lang="es-ES"/>
           </a:p>
@@ -2904,7 +2912,7 @@
           <a:p>
             <a:fld id="{3A1CB431-3844-4568-A591-C223097C649E}" type="datetimeFigureOut">
               <a:rPr lang="es-ES" smtClean="0"/>
-              <a:t>18/09/2021</a:t>
+              <a:t>16/11/2021</a:t>
             </a:fld>
             <a:endParaRPr lang="es-ES"/>
           </a:p>
@@ -3323,6 +3331,41 @@
       </p:grpSpPr>
       <p:sp>
         <p:nvSpPr>
+          <p:cNvPr id="206" name="CuadroTexto 205">
+            <a:extLst>
+              <a:ext uri="{FF2B5EF4-FFF2-40B4-BE49-F238E27FC236}">
+                <a16:creationId xmlns:a16="http://schemas.microsoft.com/office/drawing/2014/main" id="{9891B2F5-CE55-4EA7-B1B5-C98D9EA0C0CD}"/>
+              </a:ext>
+            </a:extLst>
+          </p:cNvPr>
+          <p:cNvSpPr txBox="1"/>
+          <p:nvPr/>
+        </p:nvSpPr>
+        <p:spPr>
+          <a:xfrm rot="18900000">
+            <a:off x="9558684" y="2410045"/>
+            <a:ext cx="1031187" cy="461665"/>
+          </a:xfrm>
+          <a:prstGeom prst="rect">
+            <a:avLst/>
+          </a:prstGeom>
+          <a:noFill/>
+        </p:spPr>
+        <p:txBody>
+          <a:bodyPr vert="horz" wrap="square" rtlCol="0">
+            <a:spAutoFit/>
+          </a:bodyPr>
+          <a:lstStyle/>
+          <a:p>
+            <a:r>
+              <a:rPr lang="es-ES" sz="1200"/>
+              <a:t>Cerdanyola del Vallès</a:t>
+            </a:r>
+          </a:p>
+        </p:txBody>
+      </p:sp>
+      <p:sp>
+        <p:nvSpPr>
           <p:cNvPr id="203" name="CuadroTexto 202">
             <a:extLst>
               <a:ext uri="{FF2B5EF4-FFF2-40B4-BE49-F238E27FC236}">
@@ -3350,7 +3393,7 @@
           <a:lstStyle/>
           <a:p>
             <a:r>
-              <a:rPr lang="es-ES" sz="1200" dirty="0"/>
+              <a:rPr lang="es-ES" sz="1200"/>
               <a:t>Sant Cugat del Vallès</a:t>
             </a:r>
           </a:p>
@@ -3507,7 +3550,7 @@
           <a:lstStyle/>
           <a:p>
             <a:pPr algn="ctr"/>
-            <a:endParaRPr lang="es-ES" sz="900" b="1" dirty="0"/>
+            <a:endParaRPr lang="es-ES" sz="900" b="1"/>
           </a:p>
         </p:txBody>
       </p:sp>
@@ -3656,7 +3699,7 @@
           <a:lstStyle/>
           <a:p>
             <a:pPr algn="ctr"/>
-            <a:endParaRPr lang="es-ES" sz="900" b="1" dirty="0"/>
+            <a:endParaRPr lang="es-ES" sz="900" b="1"/>
           </a:p>
         </p:txBody>
       </p:sp>
@@ -3863,7 +3906,7 @@
           <a:p>
             <a:pPr algn="ctr"/>
             <a:r>
-              <a:rPr lang="es-ES" sz="4800" b="1" dirty="0"/>
+              <a:rPr lang="es-ES" sz="4800" b="1"/>
               <a:t>R8</a:t>
             </a:r>
           </a:p>
@@ -3918,7 +3961,7 @@
           <a:p>
             <a:pPr algn="ctr"/>
             <a:r>
-              <a:rPr lang="es-ES" sz="4800" b="1" dirty="0"/>
+              <a:rPr lang="es-ES" sz="4800" b="1"/>
               <a:t>R7</a:t>
             </a:r>
           </a:p>
@@ -3973,7 +4016,7 @@
           <a:p>
             <a:pPr algn="ctr"/>
             <a:r>
-              <a:rPr lang="es-ES" sz="4800" b="1" dirty="0"/>
+              <a:rPr lang="es-ES" sz="4800" b="1"/>
               <a:t>R4</a:t>
             </a:r>
           </a:p>
@@ -4028,7 +4071,7 @@
           <a:p>
             <a:pPr algn="ctr"/>
             <a:r>
-              <a:rPr lang="es-ES" sz="3600" b="1" dirty="0">
+              <a:rPr lang="es-ES" sz="3600" b="1">
                 <a:solidFill>
                   <a:schemeClr val="tx1"/>
                 </a:solidFill>
@@ -4081,7 +4124,7 @@
           <a:p>
             <a:pPr algn="ctr"/>
             <a:r>
-              <a:rPr lang="es-ES" sz="1200" b="1" dirty="0">
+              <a:rPr lang="es-ES" sz="1200" b="1">
                 <a:solidFill>
                   <a:schemeClr val="bg1">
                     <a:lumMod val="95000"/>
@@ -4136,7 +4179,7 @@
           <a:p>
             <a:pPr algn="ctr"/>
             <a:r>
-              <a:rPr lang="es-ES" sz="1200" b="1" dirty="0">
+              <a:rPr lang="es-ES" sz="1200" b="1">
                 <a:solidFill>
                   <a:schemeClr val="bg1">
                     <a:lumMod val="95000"/>
@@ -4146,7 +4189,7 @@
               <a:t>Cerdanyola </a:t>
             </a:r>
             <a:r>
-              <a:rPr lang="es-ES" sz="1200" b="1" dirty="0" err="1">
+              <a:rPr lang="es-ES" sz="1200" b="1" err="1">
                 <a:solidFill>
                   <a:schemeClr val="bg1">
                     <a:lumMod val="95000"/>
@@ -4155,7 +4198,7 @@
               </a:rPr>
               <a:t>Universitat</a:t>
             </a:r>
-            <a:endParaRPr lang="es-ES" sz="1200" b="1" dirty="0">
+            <a:endParaRPr lang="es-ES" sz="1200" b="1">
               <a:solidFill>
                 <a:schemeClr val="bg1">
                   <a:lumMod val="95000"/>
@@ -4208,7 +4251,7 @@
           <a:p>
             <a:pPr algn="ctr"/>
             <a:r>
-              <a:rPr lang="es-ES" sz="1200" b="1" i="0" u="none" strike="noStrike" baseline="0" dirty="0">
+              <a:rPr lang="es-ES" sz="1200" b="1" i="0" u="none" strike="noStrike" baseline="0">
                 <a:solidFill>
                   <a:schemeClr val="bg1">
                     <a:lumMod val="95000"/>
@@ -4217,7 +4260,7 @@
               </a:rPr>
               <a:t>Montcada i Reixac - Sta. Maria</a:t>
             </a:r>
-            <a:endParaRPr lang="es-ES" sz="1200" b="1" dirty="0">
+            <a:endParaRPr lang="es-ES" sz="1200" b="1">
               <a:solidFill>
                 <a:schemeClr val="bg1">
                   <a:lumMod val="95000"/>
@@ -4952,7 +4995,7 @@
           <a:p>
             <a:pPr algn="ctr"/>
             <a:r>
-              <a:rPr lang="es-ES" sz="4800" b="1" dirty="0"/>
+              <a:rPr lang="es-ES" sz="4800" b="1"/>
               <a:t>S1</a:t>
             </a:r>
           </a:p>
@@ -5417,7 +5460,7 @@
           <a:p>
             <a:pPr algn="ctr"/>
             <a:r>
-              <a:rPr lang="es-ES" sz="1200" b="1" dirty="0">
+              <a:rPr lang="es-ES" sz="1200" b="1">
                 <a:solidFill>
                   <a:schemeClr val="bg1">
                     <a:lumMod val="95000"/>
@@ -5427,7 +5470,7 @@
               <a:t>Terrassa </a:t>
             </a:r>
             <a:r>
-              <a:rPr lang="es-ES" sz="1200" b="1" dirty="0" err="1">
+              <a:rPr lang="es-ES" sz="1200" b="1" err="1">
                 <a:solidFill>
                   <a:schemeClr val="bg1">
                     <a:lumMod val="95000"/>
@@ -5437,7 +5480,7 @@
               <a:t>Estació</a:t>
             </a:r>
             <a:r>
-              <a:rPr lang="es-ES" sz="1200" b="1" dirty="0">
+              <a:rPr lang="es-ES" sz="1200" b="1">
                 <a:solidFill>
                   <a:schemeClr val="bg1">
                     <a:lumMod val="95000"/>
@@ -5492,7 +5535,7 @@
           <a:p>
             <a:pPr algn="r"/>
             <a:r>
-              <a:rPr lang="es-ES" sz="900" b="1" dirty="0"/>
+              <a:rPr lang="es-ES" sz="900" b="1"/>
               <a:t>20:25</a:t>
             </a:r>
           </a:p>
@@ -5553,7 +5596,7 @@
           <a:lstStyle/>
           <a:p>
             <a:r>
-              <a:rPr lang="es-ES" sz="900" b="1" dirty="0"/>
+              <a:rPr lang="es-ES" sz="900" b="1"/>
               <a:t>15:50</a:t>
             </a:r>
           </a:p>
@@ -5660,7 +5703,7 @@
           <a:lstStyle/>
           <a:p>
             <a:pPr algn="ctr"/>
-            <a:endParaRPr lang="es-ES" sz="900" b="1" dirty="0"/>
+            <a:endParaRPr lang="es-ES" sz="900" b="1"/>
           </a:p>
         </p:txBody>
       </p:sp>
@@ -5693,7 +5736,7 @@
           <a:lstStyle/>
           <a:p>
             <a:r>
-              <a:rPr lang="es-ES" sz="1050" b="1" dirty="0"/>
+              <a:rPr lang="es-ES" sz="1050" b="1"/>
               <a:t>20:25</a:t>
             </a:r>
           </a:p>
@@ -5728,7 +5771,7 @@
           <a:lstStyle/>
           <a:p>
             <a:r>
-              <a:rPr lang="es-ES" sz="1050" b="1" dirty="0"/>
+              <a:rPr lang="es-ES" sz="1050" b="1"/>
               <a:t>20:25</a:t>
             </a:r>
           </a:p>
@@ -7818,41 +7861,6 @@
           </a:fontRef>
         </p:style>
       </p:cxnSp>
-      <p:sp>
-        <p:nvSpPr>
-          <p:cNvPr id="206" name="CuadroTexto 205">
-            <a:extLst>
-              <a:ext uri="{FF2B5EF4-FFF2-40B4-BE49-F238E27FC236}">
-                <a16:creationId xmlns:a16="http://schemas.microsoft.com/office/drawing/2014/main" id="{9891B2F5-CE55-4EA7-B1B5-C98D9EA0C0CD}"/>
-              </a:ext>
-            </a:extLst>
-          </p:cNvPr>
-          <p:cNvSpPr txBox="1"/>
-          <p:nvPr/>
-        </p:nvSpPr>
-        <p:spPr>
-          <a:xfrm rot="18900000">
-            <a:off x="9558684" y="2410045"/>
-            <a:ext cx="1031187" cy="461665"/>
-          </a:xfrm>
-          <a:prstGeom prst="rect">
-            <a:avLst/>
-          </a:prstGeom>
-          <a:noFill/>
-        </p:spPr>
-        <p:txBody>
-          <a:bodyPr vert="horz" wrap="square" rtlCol="0">
-            <a:spAutoFit/>
-          </a:bodyPr>
-          <a:lstStyle/>
-          <a:p>
-            <a:r>
-              <a:rPr lang="es-ES" sz="1200" dirty="0"/>
-              <a:t>Cerdanyola del Vallès</a:t>
-            </a:r>
-          </a:p>
-        </p:txBody>
-      </p:sp>
       <p:cxnSp>
         <p:nvCxnSpPr>
           <p:cNvPr id="209" name="Conector recto 208">
@@ -7912,6 +7920,3863 @@
     <p:extLst>
       <p:ext uri="{BB962C8B-B14F-4D97-AF65-F5344CB8AC3E}">
         <p14:creationId xmlns:p14="http://schemas.microsoft.com/office/powerpoint/2010/main" val="2132259252"/>
+      </p:ext>
+    </p:extLst>
+  </p:cSld>
+  <p:clrMapOvr>
+    <a:masterClrMapping/>
+  </p:clrMapOvr>
+</p:sld>
+</file>
+
+<file path=ppt/slides/slide2.xml><?xml version="1.0" encoding="utf-8"?>
+<p:sld xmlns:a="http://schemas.openxmlformats.org/drawingml/2006/main" xmlns:r="http://schemas.openxmlformats.org/officeDocument/2006/relationships" xmlns:p="http://schemas.openxmlformats.org/presentationml/2006/main">
+  <p:cSld>
+    <p:spTree>
+      <p:nvGrpSpPr>
+        <p:cNvPr id="1" name=""/>
+        <p:cNvGrpSpPr/>
+        <p:nvPr/>
+      </p:nvGrpSpPr>
+      <p:grpSpPr>
+        <a:xfrm>
+          <a:off x="0" y="0"/>
+          <a:ext cx="0" cy="0"/>
+          <a:chOff x="0" y="0"/>
+          <a:chExt cx="0" cy="0"/>
+        </a:xfrm>
+      </p:grpSpPr>
+      <p:pic>
+        <p:nvPicPr>
+          <p:cNvPr id="42" name="Imagen 41">
+            <a:extLst>
+              <a:ext uri="{FF2B5EF4-FFF2-40B4-BE49-F238E27FC236}">
+                <a16:creationId xmlns:a16="http://schemas.microsoft.com/office/drawing/2014/main" id="{BF9206E8-53B8-4390-BCE8-30DFE1C28C47}"/>
+              </a:ext>
+            </a:extLst>
+          </p:cNvPr>
+          <p:cNvPicPr>
+            <a:picLocks noChangeAspect="1"/>
+          </p:cNvPicPr>
+          <p:nvPr/>
+        </p:nvPicPr>
+        <p:blipFill>
+          <a:blip r:embed="rId2">
+            <a:alphaModFix amt="20000"/>
+          </a:blip>
+          <a:stretch>
+            <a:fillRect/>
+          </a:stretch>
+        </p:blipFill>
+        <p:spPr>
+          <a:xfrm>
+            <a:off x="2628900" y="723900"/>
+            <a:ext cx="6934200" cy="5410200"/>
+          </a:xfrm>
+          <a:prstGeom prst="rect">
+            <a:avLst/>
+          </a:prstGeom>
+        </p:spPr>
+      </p:pic>
+      <p:cxnSp>
+        <p:nvCxnSpPr>
+          <p:cNvPr id="55" name="Conector recto 54">
+            <a:extLst>
+              <a:ext uri="{FF2B5EF4-FFF2-40B4-BE49-F238E27FC236}">
+                <a16:creationId xmlns:a16="http://schemas.microsoft.com/office/drawing/2014/main" id="{8EF152B4-FB26-49E5-B0A1-F9EAD9ADC745}"/>
+              </a:ext>
+            </a:extLst>
+          </p:cNvPr>
+          <p:cNvCxnSpPr/>
+          <p:nvPr/>
+        </p:nvCxnSpPr>
+        <p:spPr>
+          <a:xfrm>
+            <a:off x="3624552" y="4320699"/>
+            <a:ext cx="801403" cy="0"/>
+          </a:xfrm>
+          <a:prstGeom prst="line">
+            <a:avLst/>
+          </a:prstGeom>
+          <a:ln w="19050">
+            <a:solidFill>
+              <a:srgbClr val="428479"/>
+            </a:solidFill>
+          </a:ln>
+        </p:spPr>
+        <p:style>
+          <a:lnRef idx="1">
+            <a:schemeClr val="accent1"/>
+          </a:lnRef>
+          <a:fillRef idx="0">
+            <a:schemeClr val="accent1"/>
+          </a:fillRef>
+          <a:effectRef idx="0">
+            <a:schemeClr val="accent1"/>
+          </a:effectRef>
+          <a:fontRef idx="minor">
+            <a:schemeClr val="tx1"/>
+          </a:fontRef>
+        </p:style>
+      </p:cxnSp>
+      <p:cxnSp>
+        <p:nvCxnSpPr>
+          <p:cNvPr id="59" name="Conector recto 58">
+            <a:extLst>
+              <a:ext uri="{FF2B5EF4-FFF2-40B4-BE49-F238E27FC236}">
+                <a16:creationId xmlns:a16="http://schemas.microsoft.com/office/drawing/2014/main" id="{5B8A0979-89E6-4CC2-8ADC-DBF4B4A41F13}"/>
+              </a:ext>
+            </a:extLst>
+          </p:cNvPr>
+          <p:cNvCxnSpPr/>
+          <p:nvPr/>
+        </p:nvCxnSpPr>
+        <p:spPr>
+          <a:xfrm>
+            <a:off x="7680329" y="4320699"/>
+            <a:ext cx="468000" cy="0"/>
+          </a:xfrm>
+          <a:prstGeom prst="line">
+            <a:avLst/>
+          </a:prstGeom>
+          <a:ln w="19050">
+            <a:solidFill>
+              <a:srgbClr val="428479"/>
+            </a:solidFill>
+          </a:ln>
+        </p:spPr>
+        <p:style>
+          <a:lnRef idx="1">
+            <a:schemeClr val="accent1"/>
+          </a:lnRef>
+          <a:fillRef idx="0">
+            <a:schemeClr val="accent1"/>
+          </a:fillRef>
+          <a:effectRef idx="0">
+            <a:schemeClr val="accent1"/>
+          </a:effectRef>
+          <a:fontRef idx="minor">
+            <a:schemeClr val="tx1"/>
+          </a:fontRef>
+        </p:style>
+      </p:cxnSp>
+      <p:cxnSp>
+        <p:nvCxnSpPr>
+          <p:cNvPr id="5" name="Conector recto 4">
+            <a:extLst>
+              <a:ext uri="{FF2B5EF4-FFF2-40B4-BE49-F238E27FC236}">
+                <a16:creationId xmlns:a16="http://schemas.microsoft.com/office/drawing/2014/main" id="{F2D939EB-6288-44DB-B576-9416723FAFFD}"/>
+              </a:ext>
+            </a:extLst>
+          </p:cNvPr>
+          <p:cNvCxnSpPr>
+            <a:cxnSpLocks/>
+            <a:stCxn id="4" idx="6"/>
+            <a:endCxn id="50" idx="3"/>
+          </p:cNvCxnSpPr>
+          <p:nvPr/>
+        </p:nvCxnSpPr>
+        <p:spPr>
+          <a:xfrm>
+            <a:off x="4567734" y="4311174"/>
+            <a:ext cx="3047612" cy="1272"/>
+          </a:xfrm>
+          <a:prstGeom prst="line">
+            <a:avLst/>
+          </a:prstGeom>
+          <a:ln w="38100">
+            <a:solidFill>
+              <a:srgbClr val="428479"/>
+            </a:solidFill>
+          </a:ln>
+        </p:spPr>
+        <p:style>
+          <a:lnRef idx="1">
+            <a:schemeClr val="accent1"/>
+          </a:lnRef>
+          <a:fillRef idx="0">
+            <a:schemeClr val="accent1"/>
+          </a:fillRef>
+          <a:effectRef idx="0">
+            <a:schemeClr val="accent1"/>
+          </a:effectRef>
+          <a:fontRef idx="minor">
+            <a:schemeClr val="tx1"/>
+          </a:fontRef>
+        </p:style>
+      </p:cxnSp>
+      <p:sp>
+        <p:nvSpPr>
+          <p:cNvPr id="8" name="CuadroTexto 7">
+            <a:extLst>
+              <a:ext uri="{FF2B5EF4-FFF2-40B4-BE49-F238E27FC236}">
+                <a16:creationId xmlns:a16="http://schemas.microsoft.com/office/drawing/2014/main" id="{ED39C2DF-DE2B-437E-8227-E2F7AC46D17B}"/>
+              </a:ext>
+            </a:extLst>
+          </p:cNvPr>
+          <p:cNvSpPr txBox="1"/>
+          <p:nvPr/>
+        </p:nvSpPr>
+        <p:spPr>
+          <a:xfrm rot="18900000">
+            <a:off x="8091091" y="3860072"/>
+            <a:ext cx="814699" cy="276999"/>
+          </a:xfrm>
+          <a:prstGeom prst="rect">
+            <a:avLst/>
+          </a:prstGeom>
+          <a:noFill/>
+        </p:spPr>
+        <p:txBody>
+          <a:bodyPr vert="horz" wrap="square" rtlCol="0">
+            <a:spAutoFit/>
+          </a:bodyPr>
+          <a:lstStyle/>
+          <a:p>
+            <a:r>
+              <a:rPr lang="es-ES" sz="1200"/>
+              <a:t>Can </a:t>
+            </a:r>
+            <a:r>
+              <a:rPr lang="es-ES" sz="1200" err="1"/>
+              <a:t>Rosés</a:t>
+            </a:r>
+            <a:endParaRPr lang="es-ES" sz="1200"/>
+          </a:p>
+        </p:txBody>
+      </p:sp>
+      <p:sp>
+        <p:nvSpPr>
+          <p:cNvPr id="12" name="CuadroTexto 11">
+            <a:extLst>
+              <a:ext uri="{FF2B5EF4-FFF2-40B4-BE49-F238E27FC236}">
+                <a16:creationId xmlns:a16="http://schemas.microsoft.com/office/drawing/2014/main" id="{7C4468ED-A4DC-4AF8-9658-38017BE944A7}"/>
+              </a:ext>
+            </a:extLst>
+          </p:cNvPr>
+          <p:cNvSpPr txBox="1"/>
+          <p:nvPr/>
+        </p:nvSpPr>
+        <p:spPr>
+          <a:xfrm rot="18900000">
+            <a:off x="3499983" y="4589696"/>
+            <a:ext cx="1169689" cy="276999"/>
+          </a:xfrm>
+          <a:prstGeom prst="rect">
+            <a:avLst/>
+          </a:prstGeom>
+          <a:noFill/>
+        </p:spPr>
+        <p:txBody>
+          <a:bodyPr vert="horz" wrap="square" rtlCol="0">
+            <a:spAutoFit/>
+          </a:bodyPr>
+          <a:lstStyle/>
+          <a:p>
+            <a:r>
+              <a:rPr lang="es-ES" sz="1200" err="1"/>
+              <a:t>Països</a:t>
+            </a:r>
+            <a:r>
+              <a:rPr lang="es-ES" sz="1200"/>
+              <a:t> </a:t>
+            </a:r>
+            <a:r>
+              <a:rPr lang="es-ES" sz="1200" err="1"/>
+              <a:t>Catalans</a:t>
+            </a:r>
+            <a:endParaRPr lang="es-ES" sz="1200"/>
+          </a:p>
+        </p:txBody>
+      </p:sp>
+      <p:cxnSp>
+        <p:nvCxnSpPr>
+          <p:cNvPr id="13" name="Conector recto 12">
+            <a:extLst>
+              <a:ext uri="{FF2B5EF4-FFF2-40B4-BE49-F238E27FC236}">
+                <a16:creationId xmlns:a16="http://schemas.microsoft.com/office/drawing/2014/main" id="{18EA2F74-30A9-46E7-8273-3DC30763DE4F}"/>
+              </a:ext>
+            </a:extLst>
+          </p:cNvPr>
+          <p:cNvCxnSpPr>
+            <a:cxnSpLocks/>
+            <a:endCxn id="46" idx="2"/>
+          </p:cNvCxnSpPr>
+          <p:nvPr/>
+        </p:nvCxnSpPr>
+        <p:spPr>
+          <a:xfrm flipV="1">
+            <a:off x="5076825" y="3936723"/>
+            <a:ext cx="1910222" cy="2976"/>
+          </a:xfrm>
+          <a:prstGeom prst="line">
+            <a:avLst/>
+          </a:prstGeom>
+          <a:ln w="38100">
+            <a:solidFill>
+              <a:schemeClr val="accent1"/>
+            </a:solidFill>
+          </a:ln>
+        </p:spPr>
+        <p:style>
+          <a:lnRef idx="1">
+            <a:schemeClr val="accent1"/>
+          </a:lnRef>
+          <a:fillRef idx="0">
+            <a:schemeClr val="accent1"/>
+          </a:fillRef>
+          <a:effectRef idx="0">
+            <a:schemeClr val="accent1"/>
+          </a:effectRef>
+          <a:fontRef idx="minor">
+            <a:schemeClr val="tx1"/>
+          </a:fontRef>
+        </p:style>
+      </p:cxnSp>
+      <p:cxnSp>
+        <p:nvCxnSpPr>
+          <p:cNvPr id="14" name="Conector recto 13">
+            <a:extLst>
+              <a:ext uri="{FF2B5EF4-FFF2-40B4-BE49-F238E27FC236}">
+                <a16:creationId xmlns:a16="http://schemas.microsoft.com/office/drawing/2014/main" id="{7D985ACF-4A1B-47B2-A59E-91A175778F6A}"/>
+              </a:ext>
+            </a:extLst>
+          </p:cNvPr>
+          <p:cNvCxnSpPr>
+            <a:cxnSpLocks/>
+            <a:stCxn id="4" idx="7"/>
+            <a:endCxn id="27" idx="2"/>
+          </p:cNvCxnSpPr>
+          <p:nvPr/>
+        </p:nvCxnSpPr>
+        <p:spPr>
+          <a:xfrm flipV="1">
+            <a:off x="4546646" y="3939835"/>
+            <a:ext cx="530179" cy="320427"/>
+          </a:xfrm>
+          <a:prstGeom prst="line">
+            <a:avLst/>
+          </a:prstGeom>
+          <a:ln w="38100">
+            <a:solidFill>
+              <a:schemeClr val="accent1"/>
+            </a:solidFill>
+          </a:ln>
+        </p:spPr>
+        <p:style>
+          <a:lnRef idx="1">
+            <a:schemeClr val="accent1"/>
+          </a:lnRef>
+          <a:fillRef idx="0">
+            <a:schemeClr val="accent1"/>
+          </a:fillRef>
+          <a:effectRef idx="0">
+            <a:schemeClr val="accent1"/>
+          </a:effectRef>
+          <a:fontRef idx="minor">
+            <a:schemeClr val="tx1"/>
+          </a:fontRef>
+        </p:style>
+      </p:cxnSp>
+      <p:sp>
+        <p:nvSpPr>
+          <p:cNvPr id="27" name="Elipse 26">
+            <a:extLst>
+              <a:ext uri="{FF2B5EF4-FFF2-40B4-BE49-F238E27FC236}">
+                <a16:creationId xmlns:a16="http://schemas.microsoft.com/office/drawing/2014/main" id="{E96BF921-A172-42C7-9D64-A5EAE60665A8}"/>
+              </a:ext>
+            </a:extLst>
+          </p:cNvPr>
+          <p:cNvSpPr/>
+          <p:nvPr/>
+        </p:nvSpPr>
+        <p:spPr>
+          <a:xfrm>
+            <a:off x="5076825" y="3885835"/>
+            <a:ext cx="108000" cy="108000"/>
+          </a:xfrm>
+          <a:prstGeom prst="ellipse">
+            <a:avLst/>
+          </a:prstGeom>
+          <a:solidFill>
+            <a:schemeClr val="accent5">
+              <a:lumMod val="60000"/>
+              <a:lumOff val="40000"/>
+            </a:schemeClr>
+          </a:solidFill>
+          <a:ln>
+            <a:solidFill>
+              <a:srgbClr val="0070C0"/>
+            </a:solidFill>
+          </a:ln>
+        </p:spPr>
+        <p:style>
+          <a:lnRef idx="2">
+            <a:schemeClr val="accent1">
+              <a:shade val="50000"/>
+            </a:schemeClr>
+          </a:lnRef>
+          <a:fillRef idx="1">
+            <a:schemeClr val="accent1"/>
+          </a:fillRef>
+          <a:effectRef idx="0">
+            <a:schemeClr val="accent1"/>
+          </a:effectRef>
+          <a:fontRef idx="minor">
+            <a:schemeClr val="lt1"/>
+          </a:fontRef>
+        </p:style>
+        <p:txBody>
+          <a:bodyPr rtlCol="0" anchor="ctr"/>
+          <a:lstStyle/>
+          <a:p>
+            <a:pPr algn="ctr"/>
+            <a:endParaRPr lang="es-ES"/>
+          </a:p>
+        </p:txBody>
+      </p:sp>
+      <p:sp>
+        <p:nvSpPr>
+          <p:cNvPr id="28" name="Elipse 27">
+            <a:extLst>
+              <a:ext uri="{FF2B5EF4-FFF2-40B4-BE49-F238E27FC236}">
+                <a16:creationId xmlns:a16="http://schemas.microsoft.com/office/drawing/2014/main" id="{D5F66B02-563E-4D17-8A77-7593C5DAA88C}"/>
+              </a:ext>
+            </a:extLst>
+          </p:cNvPr>
+          <p:cNvSpPr/>
+          <p:nvPr/>
+        </p:nvSpPr>
+        <p:spPr>
+          <a:xfrm>
+            <a:off x="7569154" y="4260262"/>
+            <a:ext cx="108000" cy="108000"/>
+          </a:xfrm>
+          <a:prstGeom prst="ellipse">
+            <a:avLst/>
+          </a:prstGeom>
+          <a:solidFill>
+            <a:schemeClr val="accent6">
+              <a:lumMod val="75000"/>
+            </a:schemeClr>
+          </a:solidFill>
+          <a:ln>
+            <a:solidFill>
+              <a:schemeClr val="accent6">
+                <a:lumMod val="60000"/>
+                <a:lumOff val="40000"/>
+              </a:schemeClr>
+            </a:solidFill>
+          </a:ln>
+        </p:spPr>
+        <p:style>
+          <a:lnRef idx="2">
+            <a:schemeClr val="accent1">
+              <a:shade val="50000"/>
+            </a:schemeClr>
+          </a:lnRef>
+          <a:fillRef idx="1">
+            <a:schemeClr val="accent1"/>
+          </a:fillRef>
+          <a:effectRef idx="0">
+            <a:schemeClr val="accent1"/>
+          </a:effectRef>
+          <a:fontRef idx="minor">
+            <a:schemeClr val="lt1"/>
+          </a:fontRef>
+        </p:style>
+        <p:txBody>
+          <a:bodyPr rtlCol="0" anchor="ctr"/>
+          <a:lstStyle/>
+          <a:p>
+            <a:pPr algn="ctr"/>
+            <a:endParaRPr lang="es-ES"/>
+          </a:p>
+        </p:txBody>
+      </p:sp>
+      <p:sp>
+        <p:nvSpPr>
+          <p:cNvPr id="37" name="CuadroTexto 36">
+            <a:extLst>
+              <a:ext uri="{FF2B5EF4-FFF2-40B4-BE49-F238E27FC236}">
+                <a16:creationId xmlns:a16="http://schemas.microsoft.com/office/drawing/2014/main" id="{94B162C1-1477-4FA2-AC42-7A36CD6A768A}"/>
+              </a:ext>
+            </a:extLst>
+          </p:cNvPr>
+          <p:cNvSpPr txBox="1"/>
+          <p:nvPr/>
+        </p:nvSpPr>
+        <p:spPr>
+          <a:xfrm rot="18900000">
+            <a:off x="3387815" y="3767493"/>
+            <a:ext cx="1112469" cy="276999"/>
+          </a:xfrm>
+          <a:prstGeom prst="rect">
+            <a:avLst/>
+          </a:prstGeom>
+          <a:noFill/>
+        </p:spPr>
+        <p:txBody>
+          <a:bodyPr vert="horz" wrap="square" rtlCol="0">
+            <a:spAutoFit/>
+          </a:bodyPr>
+          <a:lstStyle/>
+          <a:p>
+            <a:r>
+              <a:rPr lang="es-ES" sz="1200" err="1"/>
+              <a:t>Estació</a:t>
+            </a:r>
+            <a:r>
+              <a:rPr lang="es-ES" sz="1200"/>
+              <a:t> </a:t>
+            </a:r>
+            <a:r>
+              <a:rPr lang="es-ES" sz="1200" err="1"/>
+              <a:t>RubÍ+D</a:t>
+            </a:r>
+            <a:endParaRPr lang="es-ES" sz="1200"/>
+          </a:p>
+        </p:txBody>
+      </p:sp>
+      <p:sp>
+        <p:nvSpPr>
+          <p:cNvPr id="40" name="CuadroTexto 39">
+            <a:extLst>
+              <a:ext uri="{FF2B5EF4-FFF2-40B4-BE49-F238E27FC236}">
+                <a16:creationId xmlns:a16="http://schemas.microsoft.com/office/drawing/2014/main" id="{BC391A74-93B0-4394-A365-B0074DB473D3}"/>
+              </a:ext>
+            </a:extLst>
+          </p:cNvPr>
+          <p:cNvSpPr txBox="1"/>
+          <p:nvPr/>
+        </p:nvSpPr>
+        <p:spPr>
+          <a:xfrm>
+            <a:off x="6873646" y="352425"/>
+            <a:ext cx="2689454" cy="369332"/>
+          </a:xfrm>
+          <a:prstGeom prst="rect">
+            <a:avLst/>
+          </a:prstGeom>
+          <a:noFill/>
+        </p:spPr>
+        <p:txBody>
+          <a:bodyPr wrap="none" rtlCol="0">
+            <a:spAutoFit/>
+          </a:bodyPr>
+          <a:lstStyle/>
+          <a:p>
+            <a:r>
+              <a:rPr lang="es-ES"/>
+              <a:t>Transporte urbano de Rubí</a:t>
+            </a:r>
+          </a:p>
+        </p:txBody>
+      </p:sp>
+      <p:cxnSp>
+        <p:nvCxnSpPr>
+          <p:cNvPr id="45" name="Conector recto 44">
+            <a:extLst>
+              <a:ext uri="{FF2B5EF4-FFF2-40B4-BE49-F238E27FC236}">
+                <a16:creationId xmlns:a16="http://schemas.microsoft.com/office/drawing/2014/main" id="{1CC32BA5-3B8B-4E7D-BA1B-74CF334AEBB1}"/>
+              </a:ext>
+            </a:extLst>
+          </p:cNvPr>
+          <p:cNvCxnSpPr>
+            <a:cxnSpLocks/>
+            <a:stCxn id="28" idx="1"/>
+            <a:endCxn id="46" idx="6"/>
+          </p:cNvCxnSpPr>
+          <p:nvPr/>
+        </p:nvCxnSpPr>
+        <p:spPr>
+          <a:xfrm flipH="1" flipV="1">
+            <a:off x="7095047" y="3936723"/>
+            <a:ext cx="489923" cy="339355"/>
+          </a:xfrm>
+          <a:prstGeom prst="line">
+            <a:avLst/>
+          </a:prstGeom>
+          <a:ln w="38100">
+            <a:solidFill>
+              <a:schemeClr val="accent1"/>
+            </a:solidFill>
+          </a:ln>
+        </p:spPr>
+        <p:style>
+          <a:lnRef idx="1">
+            <a:schemeClr val="accent1"/>
+          </a:lnRef>
+          <a:fillRef idx="0">
+            <a:schemeClr val="accent1"/>
+          </a:fillRef>
+          <a:effectRef idx="0">
+            <a:schemeClr val="accent1"/>
+          </a:effectRef>
+          <a:fontRef idx="minor">
+            <a:schemeClr val="tx1"/>
+          </a:fontRef>
+        </p:style>
+      </p:cxnSp>
+      <p:sp>
+        <p:nvSpPr>
+          <p:cNvPr id="46" name="Elipse 45">
+            <a:extLst>
+              <a:ext uri="{FF2B5EF4-FFF2-40B4-BE49-F238E27FC236}">
+                <a16:creationId xmlns:a16="http://schemas.microsoft.com/office/drawing/2014/main" id="{E96BAD64-012C-4C71-8245-503DBEA2F866}"/>
+              </a:ext>
+            </a:extLst>
+          </p:cNvPr>
+          <p:cNvSpPr/>
+          <p:nvPr/>
+        </p:nvSpPr>
+        <p:spPr>
+          <a:xfrm>
+            <a:off x="6987047" y="3882723"/>
+            <a:ext cx="108000" cy="108000"/>
+          </a:xfrm>
+          <a:prstGeom prst="ellipse">
+            <a:avLst/>
+          </a:prstGeom>
+          <a:solidFill>
+            <a:schemeClr val="accent5">
+              <a:lumMod val="60000"/>
+              <a:lumOff val="40000"/>
+            </a:schemeClr>
+          </a:solidFill>
+          <a:ln>
+            <a:solidFill>
+              <a:srgbClr val="0070C0"/>
+            </a:solidFill>
+          </a:ln>
+        </p:spPr>
+        <p:style>
+          <a:lnRef idx="2">
+            <a:schemeClr val="accent1">
+              <a:shade val="50000"/>
+            </a:schemeClr>
+          </a:lnRef>
+          <a:fillRef idx="1">
+            <a:schemeClr val="accent1"/>
+          </a:fillRef>
+          <a:effectRef idx="0">
+            <a:schemeClr val="accent1"/>
+          </a:effectRef>
+          <a:fontRef idx="minor">
+            <a:schemeClr val="lt1"/>
+          </a:fontRef>
+        </p:style>
+        <p:txBody>
+          <a:bodyPr rtlCol="0" anchor="ctr"/>
+          <a:lstStyle/>
+          <a:p>
+            <a:pPr algn="ctr"/>
+            <a:endParaRPr lang="es-ES"/>
+          </a:p>
+        </p:txBody>
+      </p:sp>
+      <p:sp>
+        <p:nvSpPr>
+          <p:cNvPr id="50" name="CuadroTexto 49">
+            <a:extLst>
+              <a:ext uri="{FF2B5EF4-FFF2-40B4-BE49-F238E27FC236}">
+                <a16:creationId xmlns:a16="http://schemas.microsoft.com/office/drawing/2014/main" id="{7CBE6323-2EC6-4401-8E7A-CCCE8D9733C2}"/>
+              </a:ext>
+            </a:extLst>
+          </p:cNvPr>
+          <p:cNvSpPr txBox="1"/>
+          <p:nvPr/>
+        </p:nvSpPr>
+        <p:spPr>
+          <a:xfrm rot="18900000">
+            <a:off x="7050253" y="4408015"/>
+            <a:ext cx="662047" cy="276999"/>
+          </a:xfrm>
+          <a:prstGeom prst="rect">
+            <a:avLst/>
+          </a:prstGeom>
+          <a:noFill/>
+        </p:spPr>
+        <p:txBody>
+          <a:bodyPr vert="horz" wrap="square" rtlCol="0">
+            <a:spAutoFit/>
+          </a:bodyPr>
+          <a:lstStyle/>
+          <a:p>
+            <a:r>
+              <a:rPr lang="es-ES" sz="1200" err="1"/>
+              <a:t>Els</a:t>
+            </a:r>
+            <a:r>
+              <a:rPr lang="es-ES" sz="1200"/>
+              <a:t> </a:t>
+            </a:r>
+            <a:r>
+              <a:rPr lang="es-ES" sz="1200" err="1"/>
+              <a:t>Nius</a:t>
+            </a:r>
+            <a:endParaRPr lang="es-ES" sz="1200"/>
+          </a:p>
+        </p:txBody>
+      </p:sp>
+      <p:cxnSp>
+        <p:nvCxnSpPr>
+          <p:cNvPr id="54" name="Conector recto 53">
+            <a:extLst>
+              <a:ext uri="{FF2B5EF4-FFF2-40B4-BE49-F238E27FC236}">
+                <a16:creationId xmlns:a16="http://schemas.microsoft.com/office/drawing/2014/main" id="{9ABE7EDF-F0E8-44E4-8F11-2E4B68A91541}"/>
+              </a:ext>
+            </a:extLst>
+          </p:cNvPr>
+          <p:cNvCxnSpPr/>
+          <p:nvPr/>
+        </p:nvCxnSpPr>
+        <p:spPr>
+          <a:xfrm>
+            <a:off x="3624552" y="4301649"/>
+            <a:ext cx="801403" cy="0"/>
+          </a:xfrm>
+          <a:prstGeom prst="line">
+            <a:avLst/>
+          </a:prstGeom>
+          <a:ln w="19050">
+            <a:solidFill>
+              <a:schemeClr val="accent1"/>
+            </a:solidFill>
+          </a:ln>
+        </p:spPr>
+        <p:style>
+          <a:lnRef idx="1">
+            <a:schemeClr val="accent1"/>
+          </a:lnRef>
+          <a:fillRef idx="0">
+            <a:schemeClr val="accent1"/>
+          </a:fillRef>
+          <a:effectRef idx="0">
+            <a:schemeClr val="accent1"/>
+          </a:effectRef>
+          <a:fontRef idx="minor">
+            <a:schemeClr val="tx1"/>
+          </a:fontRef>
+        </p:style>
+      </p:cxnSp>
+      <p:sp>
+        <p:nvSpPr>
+          <p:cNvPr id="4" name="Elipse 3">
+            <a:extLst>
+              <a:ext uri="{FF2B5EF4-FFF2-40B4-BE49-F238E27FC236}">
+                <a16:creationId xmlns:a16="http://schemas.microsoft.com/office/drawing/2014/main" id="{9236991A-A978-42AF-830A-DE2C1D52F5E6}"/>
+              </a:ext>
+            </a:extLst>
+          </p:cNvPr>
+          <p:cNvSpPr/>
+          <p:nvPr/>
+        </p:nvSpPr>
+        <p:spPr>
+          <a:xfrm>
+            <a:off x="4423734" y="4239174"/>
+            <a:ext cx="144000" cy="144000"/>
+          </a:xfrm>
+          <a:prstGeom prst="ellipse">
+            <a:avLst/>
+          </a:prstGeom>
+          <a:solidFill>
+            <a:schemeClr val="accent4">
+              <a:lumMod val="60000"/>
+              <a:lumOff val="40000"/>
+            </a:schemeClr>
+          </a:solidFill>
+        </p:spPr>
+        <p:style>
+          <a:lnRef idx="2">
+            <a:schemeClr val="accent1">
+              <a:shade val="50000"/>
+            </a:schemeClr>
+          </a:lnRef>
+          <a:fillRef idx="1">
+            <a:schemeClr val="accent1"/>
+          </a:fillRef>
+          <a:effectRef idx="0">
+            <a:schemeClr val="accent1"/>
+          </a:effectRef>
+          <a:fontRef idx="minor">
+            <a:schemeClr val="lt1"/>
+          </a:fontRef>
+        </p:style>
+        <p:txBody>
+          <a:bodyPr rtlCol="0" anchor="ctr"/>
+          <a:lstStyle/>
+          <a:p>
+            <a:pPr algn="ctr"/>
+            <a:endParaRPr lang="es-ES"/>
+          </a:p>
+        </p:txBody>
+      </p:sp>
+      <p:sp>
+        <p:nvSpPr>
+          <p:cNvPr id="38" name="Elipse 37">
+            <a:extLst>
+              <a:ext uri="{FF2B5EF4-FFF2-40B4-BE49-F238E27FC236}">
+                <a16:creationId xmlns:a16="http://schemas.microsoft.com/office/drawing/2014/main" id="{A05398E5-AA1C-44C5-8F21-66E6D7B710B2}"/>
+              </a:ext>
+            </a:extLst>
+          </p:cNvPr>
+          <p:cNvSpPr/>
+          <p:nvPr/>
+        </p:nvSpPr>
+        <p:spPr>
+          <a:xfrm>
+            <a:off x="3479065" y="4239174"/>
+            <a:ext cx="144000" cy="144000"/>
+          </a:xfrm>
+          <a:prstGeom prst="ellipse">
+            <a:avLst/>
+          </a:prstGeom>
+          <a:solidFill>
+            <a:schemeClr val="accent4">
+              <a:lumMod val="60000"/>
+              <a:lumOff val="40000"/>
+            </a:schemeClr>
+          </a:solidFill>
+        </p:spPr>
+        <p:style>
+          <a:lnRef idx="2">
+            <a:schemeClr val="accent1">
+              <a:shade val="50000"/>
+            </a:schemeClr>
+          </a:lnRef>
+          <a:fillRef idx="1">
+            <a:schemeClr val="accent1"/>
+          </a:fillRef>
+          <a:effectRef idx="0">
+            <a:schemeClr val="accent1"/>
+          </a:effectRef>
+          <a:fontRef idx="minor">
+            <a:schemeClr val="lt1"/>
+          </a:fontRef>
+        </p:style>
+        <p:txBody>
+          <a:bodyPr rtlCol="0" anchor="ctr"/>
+          <a:lstStyle/>
+          <a:p>
+            <a:pPr algn="ctr"/>
+            <a:endParaRPr lang="es-ES"/>
+          </a:p>
+        </p:txBody>
+      </p:sp>
+      <p:cxnSp>
+        <p:nvCxnSpPr>
+          <p:cNvPr id="58" name="Conector recto 57">
+            <a:extLst>
+              <a:ext uri="{FF2B5EF4-FFF2-40B4-BE49-F238E27FC236}">
+                <a16:creationId xmlns:a16="http://schemas.microsoft.com/office/drawing/2014/main" id="{15525BA1-0F25-483A-9CEA-C13F90B36C09}"/>
+              </a:ext>
+            </a:extLst>
+          </p:cNvPr>
+          <p:cNvCxnSpPr/>
+          <p:nvPr/>
+        </p:nvCxnSpPr>
+        <p:spPr>
+          <a:xfrm>
+            <a:off x="7680329" y="4301649"/>
+            <a:ext cx="468000" cy="0"/>
+          </a:xfrm>
+          <a:prstGeom prst="line">
+            <a:avLst/>
+          </a:prstGeom>
+          <a:ln w="19050">
+            <a:solidFill>
+              <a:schemeClr val="accent1"/>
+            </a:solidFill>
+          </a:ln>
+        </p:spPr>
+        <p:style>
+          <a:lnRef idx="1">
+            <a:schemeClr val="accent1"/>
+          </a:lnRef>
+          <a:fillRef idx="0">
+            <a:schemeClr val="accent1"/>
+          </a:fillRef>
+          <a:effectRef idx="0">
+            <a:schemeClr val="accent1"/>
+          </a:effectRef>
+          <a:fontRef idx="minor">
+            <a:schemeClr val="tx1"/>
+          </a:fontRef>
+        </p:style>
+      </p:cxnSp>
+      <p:sp>
+        <p:nvSpPr>
+          <p:cNvPr id="10" name="Elipse 9">
+            <a:extLst>
+              <a:ext uri="{FF2B5EF4-FFF2-40B4-BE49-F238E27FC236}">
+                <a16:creationId xmlns:a16="http://schemas.microsoft.com/office/drawing/2014/main" id="{6CAA1851-E736-427E-891B-8B5F3C9E19B1}"/>
+              </a:ext>
+            </a:extLst>
+          </p:cNvPr>
+          <p:cNvSpPr/>
+          <p:nvPr/>
+        </p:nvSpPr>
+        <p:spPr>
+          <a:xfrm>
+            <a:off x="8151249" y="4239174"/>
+            <a:ext cx="144000" cy="144000"/>
+          </a:xfrm>
+          <a:prstGeom prst="ellipse">
+            <a:avLst/>
+          </a:prstGeom>
+          <a:solidFill>
+            <a:schemeClr val="accent4">
+              <a:lumMod val="60000"/>
+              <a:lumOff val="40000"/>
+            </a:schemeClr>
+          </a:solidFill>
+        </p:spPr>
+        <p:style>
+          <a:lnRef idx="2">
+            <a:schemeClr val="accent1">
+              <a:shade val="50000"/>
+            </a:schemeClr>
+          </a:lnRef>
+          <a:fillRef idx="1">
+            <a:schemeClr val="accent1"/>
+          </a:fillRef>
+          <a:effectRef idx="0">
+            <a:schemeClr val="accent1"/>
+          </a:effectRef>
+          <a:fontRef idx="minor">
+            <a:schemeClr val="lt1"/>
+          </a:fontRef>
+        </p:style>
+        <p:txBody>
+          <a:bodyPr rtlCol="0" anchor="ctr"/>
+          <a:lstStyle/>
+          <a:p>
+            <a:pPr algn="ctr"/>
+            <a:endParaRPr lang="es-ES"/>
+          </a:p>
+        </p:txBody>
+      </p:sp>
+      <p:sp>
+        <p:nvSpPr>
+          <p:cNvPr id="60" name="CuadroTexto 59">
+            <a:extLst>
+              <a:ext uri="{FF2B5EF4-FFF2-40B4-BE49-F238E27FC236}">
+                <a16:creationId xmlns:a16="http://schemas.microsoft.com/office/drawing/2014/main" id="{6736B717-9A28-4A9E-9088-695D130AF893}"/>
+              </a:ext>
+            </a:extLst>
+          </p:cNvPr>
+          <p:cNvSpPr txBox="1"/>
+          <p:nvPr/>
+        </p:nvSpPr>
+        <p:spPr>
+          <a:xfrm>
+            <a:off x="3427132" y="4319087"/>
+            <a:ext cx="495649" cy="253916"/>
+          </a:xfrm>
+          <a:prstGeom prst="rect">
+            <a:avLst/>
+          </a:prstGeom>
+          <a:noFill/>
+          <a:ln>
+            <a:noFill/>
+          </a:ln>
+        </p:spPr>
+        <p:txBody>
+          <a:bodyPr wrap="none" rtlCol="0">
+            <a:spAutoFit/>
+          </a:bodyPr>
+          <a:lstStyle/>
+          <a:p>
+            <a:r>
+              <a:rPr lang="es-ES" sz="1050">
+                <a:solidFill>
+                  <a:schemeClr val="accent5">
+                    <a:lumMod val="50000"/>
+                  </a:schemeClr>
+                </a:solidFill>
+              </a:rPr>
+              <a:t>09:35</a:t>
+            </a:r>
+          </a:p>
+        </p:txBody>
+      </p:sp>
+      <p:sp>
+        <p:nvSpPr>
+          <p:cNvPr id="61" name="CuadroTexto 60">
+            <a:extLst>
+              <a:ext uri="{FF2B5EF4-FFF2-40B4-BE49-F238E27FC236}">
+                <a16:creationId xmlns:a16="http://schemas.microsoft.com/office/drawing/2014/main" id="{5A2344A4-3180-405F-9C7D-5B8EBBA4E031}"/>
+              </a:ext>
+            </a:extLst>
+          </p:cNvPr>
+          <p:cNvSpPr txBox="1"/>
+          <p:nvPr/>
+        </p:nvSpPr>
+        <p:spPr>
+          <a:xfrm>
+            <a:off x="3188038" y="4041358"/>
+            <a:ext cx="495649" cy="253916"/>
+          </a:xfrm>
+          <a:prstGeom prst="rect">
+            <a:avLst/>
+          </a:prstGeom>
+          <a:noFill/>
+          <a:ln>
+            <a:noFill/>
+          </a:ln>
+        </p:spPr>
+        <p:txBody>
+          <a:bodyPr wrap="none" rtlCol="0">
+            <a:spAutoFit/>
+          </a:bodyPr>
+          <a:lstStyle/>
+          <a:p>
+            <a:r>
+              <a:rPr lang="es-ES" sz="1050">
+                <a:solidFill>
+                  <a:schemeClr val="accent6">
+                    <a:lumMod val="75000"/>
+                  </a:schemeClr>
+                </a:solidFill>
+              </a:rPr>
+              <a:t>09:42</a:t>
+            </a:r>
+          </a:p>
+        </p:txBody>
+      </p:sp>
+      <p:sp>
+        <p:nvSpPr>
+          <p:cNvPr id="68" name="Flecha: a la derecha 67">
+            <a:extLst>
+              <a:ext uri="{FF2B5EF4-FFF2-40B4-BE49-F238E27FC236}">
+                <a16:creationId xmlns:a16="http://schemas.microsoft.com/office/drawing/2014/main" id="{B4A64CB9-41B9-449A-88CA-44462C36F935}"/>
+              </a:ext>
+            </a:extLst>
+          </p:cNvPr>
+          <p:cNvSpPr/>
+          <p:nvPr/>
+        </p:nvSpPr>
+        <p:spPr>
+          <a:xfrm flipH="1">
+            <a:off x="5928877" y="3813414"/>
+            <a:ext cx="695362" cy="239700"/>
+          </a:xfrm>
+          <a:prstGeom prst="rightArrow">
+            <a:avLst>
+              <a:gd name="adj1" fmla="val 0"/>
+              <a:gd name="adj2" fmla="val 87181"/>
+            </a:avLst>
+          </a:prstGeom>
+          <a:solidFill>
+            <a:schemeClr val="accent5">
+              <a:lumMod val="60000"/>
+              <a:lumOff val="40000"/>
+            </a:schemeClr>
+          </a:solidFill>
+          <a:ln>
+            <a:solidFill>
+              <a:schemeClr val="accent1"/>
+            </a:solidFill>
+          </a:ln>
+        </p:spPr>
+        <p:style>
+          <a:lnRef idx="2">
+            <a:schemeClr val="accent1">
+              <a:shade val="50000"/>
+            </a:schemeClr>
+          </a:lnRef>
+          <a:fillRef idx="1">
+            <a:schemeClr val="accent1"/>
+          </a:fillRef>
+          <a:effectRef idx="0">
+            <a:schemeClr val="accent1"/>
+          </a:effectRef>
+          <a:fontRef idx="minor">
+            <a:schemeClr val="lt1"/>
+          </a:fontRef>
+        </p:style>
+        <p:txBody>
+          <a:bodyPr rtlCol="0" anchor="ctr"/>
+          <a:lstStyle/>
+          <a:p>
+            <a:pPr algn="ctr"/>
+            <a:endParaRPr lang="es-ES"/>
+          </a:p>
+        </p:txBody>
+      </p:sp>
+      <p:sp>
+        <p:nvSpPr>
+          <p:cNvPr id="69" name="CuadroTexto 68">
+            <a:extLst>
+              <a:ext uri="{FF2B5EF4-FFF2-40B4-BE49-F238E27FC236}">
+                <a16:creationId xmlns:a16="http://schemas.microsoft.com/office/drawing/2014/main" id="{31111B63-35E2-44D1-9E50-1486CD650C34}"/>
+              </a:ext>
+            </a:extLst>
+          </p:cNvPr>
+          <p:cNvSpPr txBox="1"/>
+          <p:nvPr/>
+        </p:nvSpPr>
+        <p:spPr>
+          <a:xfrm>
+            <a:off x="4370848" y="4318762"/>
+            <a:ext cx="495649" cy="253916"/>
+          </a:xfrm>
+          <a:prstGeom prst="rect">
+            <a:avLst/>
+          </a:prstGeom>
+          <a:noFill/>
+          <a:ln>
+            <a:noFill/>
+          </a:ln>
+        </p:spPr>
+        <p:txBody>
+          <a:bodyPr wrap="none" rtlCol="0">
+            <a:spAutoFit/>
+          </a:bodyPr>
+          <a:lstStyle/>
+          <a:p>
+            <a:r>
+              <a:rPr lang="es-ES" sz="1050">
+                <a:solidFill>
+                  <a:schemeClr val="accent5">
+                    <a:lumMod val="50000"/>
+                  </a:schemeClr>
+                </a:solidFill>
+              </a:rPr>
+              <a:t>09:46</a:t>
+            </a:r>
+          </a:p>
+        </p:txBody>
+      </p:sp>
+      <p:sp>
+        <p:nvSpPr>
+          <p:cNvPr id="70" name="CuadroTexto 69">
+            <a:extLst>
+              <a:ext uri="{FF2B5EF4-FFF2-40B4-BE49-F238E27FC236}">
+                <a16:creationId xmlns:a16="http://schemas.microsoft.com/office/drawing/2014/main" id="{397D7AC5-D443-4A68-A737-6696D53F827D}"/>
+              </a:ext>
+            </a:extLst>
+          </p:cNvPr>
+          <p:cNvSpPr txBox="1"/>
+          <p:nvPr/>
+        </p:nvSpPr>
+        <p:spPr>
+          <a:xfrm>
+            <a:off x="8102071" y="4318608"/>
+            <a:ext cx="495649" cy="253916"/>
+          </a:xfrm>
+          <a:prstGeom prst="rect">
+            <a:avLst/>
+          </a:prstGeom>
+          <a:noFill/>
+          <a:ln>
+            <a:noFill/>
+          </a:ln>
+        </p:spPr>
+        <p:txBody>
+          <a:bodyPr wrap="none" rtlCol="0">
+            <a:spAutoFit/>
+          </a:bodyPr>
+          <a:lstStyle/>
+          <a:p>
+            <a:r>
+              <a:rPr lang="es-ES" sz="1050">
+                <a:solidFill>
+                  <a:schemeClr val="accent5">
+                    <a:lumMod val="50000"/>
+                  </a:schemeClr>
+                </a:solidFill>
+              </a:rPr>
+              <a:t>10:05</a:t>
+            </a:r>
+          </a:p>
+        </p:txBody>
+      </p:sp>
+      <p:sp>
+        <p:nvSpPr>
+          <p:cNvPr id="71" name="CuadroTexto 70">
+            <a:extLst>
+              <a:ext uri="{FF2B5EF4-FFF2-40B4-BE49-F238E27FC236}">
+                <a16:creationId xmlns:a16="http://schemas.microsoft.com/office/drawing/2014/main" id="{D9AA3FE7-5DAA-4F11-B4B1-672F6047B2A2}"/>
+              </a:ext>
+            </a:extLst>
+          </p:cNvPr>
+          <p:cNvSpPr txBox="1"/>
+          <p:nvPr/>
+        </p:nvSpPr>
+        <p:spPr>
+          <a:xfrm>
+            <a:off x="4134646" y="4041442"/>
+            <a:ext cx="495649" cy="253916"/>
+          </a:xfrm>
+          <a:prstGeom prst="rect">
+            <a:avLst/>
+          </a:prstGeom>
+          <a:noFill/>
+          <a:ln>
+            <a:noFill/>
+          </a:ln>
+        </p:spPr>
+        <p:txBody>
+          <a:bodyPr wrap="none" rtlCol="0">
+            <a:spAutoFit/>
+          </a:bodyPr>
+          <a:lstStyle/>
+          <a:p>
+            <a:r>
+              <a:rPr lang="es-ES" sz="1050">
+                <a:solidFill>
+                  <a:schemeClr val="accent6">
+                    <a:lumMod val="75000"/>
+                  </a:schemeClr>
+                </a:solidFill>
+              </a:rPr>
+              <a:t>09:32</a:t>
+            </a:r>
+          </a:p>
+        </p:txBody>
+      </p:sp>
+      <p:sp>
+        <p:nvSpPr>
+          <p:cNvPr id="72" name="CuadroTexto 71">
+            <a:extLst>
+              <a:ext uri="{FF2B5EF4-FFF2-40B4-BE49-F238E27FC236}">
+                <a16:creationId xmlns:a16="http://schemas.microsoft.com/office/drawing/2014/main" id="{9FFC6240-D83B-459B-BFCC-F7CBD84ED934}"/>
+              </a:ext>
+            </a:extLst>
+          </p:cNvPr>
+          <p:cNvSpPr txBox="1"/>
+          <p:nvPr/>
+        </p:nvSpPr>
+        <p:spPr>
+          <a:xfrm>
+            <a:off x="7854841" y="4041442"/>
+            <a:ext cx="495649" cy="253916"/>
+          </a:xfrm>
+          <a:prstGeom prst="rect">
+            <a:avLst/>
+          </a:prstGeom>
+          <a:noFill/>
+          <a:ln>
+            <a:noFill/>
+          </a:ln>
+        </p:spPr>
+        <p:txBody>
+          <a:bodyPr wrap="none" rtlCol="0">
+            <a:spAutoFit/>
+          </a:bodyPr>
+          <a:lstStyle/>
+          <a:p>
+            <a:r>
+              <a:rPr lang="es-ES" sz="1050">
+                <a:solidFill>
+                  <a:schemeClr val="accent6">
+                    <a:lumMod val="75000"/>
+                  </a:schemeClr>
+                </a:solidFill>
+              </a:rPr>
+              <a:t>09:12</a:t>
+            </a:r>
+          </a:p>
+        </p:txBody>
+      </p:sp>
+      <p:sp>
+        <p:nvSpPr>
+          <p:cNvPr id="73" name="CuadroTexto 72">
+            <a:extLst>
+              <a:ext uri="{FF2B5EF4-FFF2-40B4-BE49-F238E27FC236}">
+                <a16:creationId xmlns:a16="http://schemas.microsoft.com/office/drawing/2014/main" id="{D1DEDA55-55B9-4B9A-8271-CEBE94FF7D70}"/>
+              </a:ext>
+            </a:extLst>
+          </p:cNvPr>
+          <p:cNvSpPr txBox="1"/>
+          <p:nvPr/>
+        </p:nvSpPr>
+        <p:spPr>
+          <a:xfrm>
+            <a:off x="2760382" y="3238500"/>
+            <a:ext cx="3646639" cy="307777"/>
+          </a:xfrm>
+          <a:prstGeom prst="rect">
+            <a:avLst/>
+          </a:prstGeom>
+          <a:noFill/>
+          <a:effectLst/>
+        </p:spPr>
+        <p:txBody>
+          <a:bodyPr wrap="none" rtlCol="0">
+            <a:spAutoFit/>
+          </a:bodyPr>
+          <a:lstStyle/>
+          <a:p>
+            <a:r>
+              <a:rPr lang="es-ES" sz="1400" err="1"/>
+              <a:t>Dilluns</a:t>
+            </a:r>
+            <a:r>
+              <a:rPr lang="es-ES" sz="1400"/>
+              <a:t>, 25/10/2021 – </a:t>
+            </a:r>
+            <a:r>
+              <a:rPr lang="es-ES" sz="1400" b="1"/>
+              <a:t>FEINER</a:t>
+            </a:r>
+            <a:r>
+              <a:rPr lang="es-ES" sz="1400">
+                <a:solidFill>
+                  <a:schemeClr val="bg1">
+                    <a:lumMod val="65000"/>
+                  </a:schemeClr>
+                </a:solidFill>
+              </a:rPr>
+              <a:t>/DISSABTE/FESTIU</a:t>
+            </a:r>
+          </a:p>
+        </p:txBody>
+      </p:sp>
+      <p:sp>
+        <p:nvSpPr>
+          <p:cNvPr id="74" name="CuadroTexto 73">
+            <a:extLst>
+              <a:ext uri="{FF2B5EF4-FFF2-40B4-BE49-F238E27FC236}">
+                <a16:creationId xmlns:a16="http://schemas.microsoft.com/office/drawing/2014/main" id="{8034D963-0B55-4D55-A5DE-15689AC051AC}"/>
+              </a:ext>
+            </a:extLst>
+          </p:cNvPr>
+          <p:cNvSpPr txBox="1"/>
+          <p:nvPr/>
+        </p:nvSpPr>
+        <p:spPr>
+          <a:xfrm>
+            <a:off x="3495712" y="4425767"/>
+            <a:ext cx="495649" cy="253916"/>
+          </a:xfrm>
+          <a:prstGeom prst="rect">
+            <a:avLst/>
+          </a:prstGeom>
+          <a:noFill/>
+          <a:ln>
+            <a:noFill/>
+          </a:ln>
+        </p:spPr>
+        <p:txBody>
+          <a:bodyPr wrap="none" rtlCol="0">
+            <a:spAutoFit/>
+          </a:bodyPr>
+          <a:lstStyle/>
+          <a:p>
+            <a:r>
+              <a:rPr lang="es-ES" sz="1050">
+                <a:solidFill>
+                  <a:schemeClr val="accent5">
+                    <a:lumMod val="75000"/>
+                  </a:schemeClr>
+                </a:solidFill>
+              </a:rPr>
+              <a:t>10:05</a:t>
+            </a:r>
+          </a:p>
+        </p:txBody>
+      </p:sp>
+      <p:sp>
+        <p:nvSpPr>
+          <p:cNvPr id="75" name="CuadroTexto 74">
+            <a:extLst>
+              <a:ext uri="{FF2B5EF4-FFF2-40B4-BE49-F238E27FC236}">
+                <a16:creationId xmlns:a16="http://schemas.microsoft.com/office/drawing/2014/main" id="{8D80D7F4-BF67-4990-9C38-A33B921294F2}"/>
+              </a:ext>
+            </a:extLst>
+          </p:cNvPr>
+          <p:cNvSpPr txBox="1"/>
+          <p:nvPr/>
+        </p:nvSpPr>
+        <p:spPr>
+          <a:xfrm>
+            <a:off x="4439428" y="4425442"/>
+            <a:ext cx="495649" cy="253916"/>
+          </a:xfrm>
+          <a:prstGeom prst="rect">
+            <a:avLst/>
+          </a:prstGeom>
+          <a:noFill/>
+          <a:ln>
+            <a:noFill/>
+          </a:ln>
+        </p:spPr>
+        <p:txBody>
+          <a:bodyPr wrap="none" rtlCol="0">
+            <a:spAutoFit/>
+          </a:bodyPr>
+          <a:lstStyle/>
+          <a:p>
+            <a:r>
+              <a:rPr lang="es-ES" sz="1050">
+                <a:solidFill>
+                  <a:schemeClr val="accent5">
+                    <a:lumMod val="75000"/>
+                  </a:schemeClr>
+                </a:solidFill>
+              </a:rPr>
+              <a:t>10:15</a:t>
+            </a:r>
+          </a:p>
+        </p:txBody>
+      </p:sp>
+      <p:sp>
+        <p:nvSpPr>
+          <p:cNvPr id="76" name="CuadroTexto 75">
+            <a:extLst>
+              <a:ext uri="{FF2B5EF4-FFF2-40B4-BE49-F238E27FC236}">
+                <a16:creationId xmlns:a16="http://schemas.microsoft.com/office/drawing/2014/main" id="{23D81E19-7900-46DD-A6C9-DDD234614158}"/>
+              </a:ext>
+            </a:extLst>
+          </p:cNvPr>
+          <p:cNvSpPr txBox="1"/>
+          <p:nvPr/>
+        </p:nvSpPr>
+        <p:spPr>
+          <a:xfrm>
+            <a:off x="8170651" y="4425288"/>
+            <a:ext cx="495649" cy="253916"/>
+          </a:xfrm>
+          <a:prstGeom prst="rect">
+            <a:avLst/>
+          </a:prstGeom>
+          <a:noFill/>
+          <a:ln>
+            <a:noFill/>
+          </a:ln>
+        </p:spPr>
+        <p:txBody>
+          <a:bodyPr wrap="none" rtlCol="0">
+            <a:spAutoFit/>
+          </a:bodyPr>
+          <a:lstStyle/>
+          <a:p>
+            <a:r>
+              <a:rPr lang="es-ES" sz="1050">
+                <a:solidFill>
+                  <a:schemeClr val="accent5">
+                    <a:lumMod val="75000"/>
+                  </a:schemeClr>
+                </a:solidFill>
+              </a:rPr>
+              <a:t>10:35</a:t>
+            </a:r>
+          </a:p>
+        </p:txBody>
+      </p:sp>
+      <p:sp>
+        <p:nvSpPr>
+          <p:cNvPr id="77" name="CuadroTexto 76">
+            <a:extLst>
+              <a:ext uri="{FF2B5EF4-FFF2-40B4-BE49-F238E27FC236}">
+                <a16:creationId xmlns:a16="http://schemas.microsoft.com/office/drawing/2014/main" id="{3DEC7277-7D19-44B3-ABE1-C391664F531C}"/>
+              </a:ext>
+            </a:extLst>
+          </p:cNvPr>
+          <p:cNvSpPr txBox="1"/>
+          <p:nvPr/>
+        </p:nvSpPr>
+        <p:spPr>
+          <a:xfrm>
+            <a:off x="3127078" y="3934678"/>
+            <a:ext cx="495649" cy="253916"/>
+          </a:xfrm>
+          <a:prstGeom prst="rect">
+            <a:avLst/>
+          </a:prstGeom>
+          <a:noFill/>
+          <a:ln>
+            <a:noFill/>
+          </a:ln>
+        </p:spPr>
+        <p:txBody>
+          <a:bodyPr wrap="none" rtlCol="0">
+            <a:spAutoFit/>
+          </a:bodyPr>
+          <a:lstStyle/>
+          <a:p>
+            <a:r>
+              <a:rPr lang="es-ES" sz="1050">
+                <a:solidFill>
+                  <a:schemeClr val="accent6">
+                    <a:lumMod val="60000"/>
+                    <a:lumOff val="40000"/>
+                  </a:schemeClr>
+                </a:solidFill>
+              </a:rPr>
+              <a:t>10:54</a:t>
+            </a:r>
+          </a:p>
+        </p:txBody>
+      </p:sp>
+      <p:sp>
+        <p:nvSpPr>
+          <p:cNvPr id="78" name="CuadroTexto 77">
+            <a:extLst>
+              <a:ext uri="{FF2B5EF4-FFF2-40B4-BE49-F238E27FC236}">
+                <a16:creationId xmlns:a16="http://schemas.microsoft.com/office/drawing/2014/main" id="{664DC629-F60E-49BB-A428-2E600581B667}"/>
+              </a:ext>
+            </a:extLst>
+          </p:cNvPr>
+          <p:cNvSpPr txBox="1"/>
+          <p:nvPr/>
+        </p:nvSpPr>
+        <p:spPr>
+          <a:xfrm>
+            <a:off x="4073686" y="3934762"/>
+            <a:ext cx="495649" cy="253916"/>
+          </a:xfrm>
+          <a:prstGeom prst="rect">
+            <a:avLst/>
+          </a:prstGeom>
+          <a:noFill/>
+          <a:ln>
+            <a:noFill/>
+          </a:ln>
+        </p:spPr>
+        <p:txBody>
+          <a:bodyPr wrap="none" rtlCol="0">
+            <a:spAutoFit/>
+          </a:bodyPr>
+          <a:lstStyle/>
+          <a:p>
+            <a:r>
+              <a:rPr lang="es-ES" sz="1050">
+                <a:solidFill>
+                  <a:schemeClr val="accent6">
+                    <a:lumMod val="60000"/>
+                    <a:lumOff val="40000"/>
+                  </a:schemeClr>
+                </a:solidFill>
+              </a:rPr>
+              <a:t>10:27</a:t>
+            </a:r>
+          </a:p>
+        </p:txBody>
+      </p:sp>
+      <p:sp>
+        <p:nvSpPr>
+          <p:cNvPr id="79" name="CuadroTexto 78">
+            <a:extLst>
+              <a:ext uri="{FF2B5EF4-FFF2-40B4-BE49-F238E27FC236}">
+                <a16:creationId xmlns:a16="http://schemas.microsoft.com/office/drawing/2014/main" id="{5EDE2217-1177-462D-B24C-D3879A6DB42B}"/>
+              </a:ext>
+            </a:extLst>
+          </p:cNvPr>
+          <p:cNvSpPr txBox="1"/>
+          <p:nvPr/>
+        </p:nvSpPr>
+        <p:spPr>
+          <a:xfrm>
+            <a:off x="7793881" y="3934762"/>
+            <a:ext cx="495649" cy="253916"/>
+          </a:xfrm>
+          <a:prstGeom prst="rect">
+            <a:avLst/>
+          </a:prstGeom>
+          <a:noFill/>
+          <a:ln>
+            <a:noFill/>
+          </a:ln>
+        </p:spPr>
+        <p:txBody>
+          <a:bodyPr wrap="none" rtlCol="0">
+            <a:spAutoFit/>
+          </a:bodyPr>
+          <a:lstStyle/>
+          <a:p>
+            <a:r>
+              <a:rPr lang="es-ES" sz="1050">
+                <a:solidFill>
+                  <a:schemeClr val="accent6">
+                    <a:lumMod val="60000"/>
+                    <a:lumOff val="40000"/>
+                  </a:schemeClr>
+                </a:solidFill>
+              </a:rPr>
+              <a:t>10:05</a:t>
+            </a:r>
+          </a:p>
+        </p:txBody>
+      </p:sp>
+      <p:sp>
+        <p:nvSpPr>
+          <p:cNvPr id="66" name="Flecha: a la derecha 65">
+            <a:extLst>
+              <a:ext uri="{FF2B5EF4-FFF2-40B4-BE49-F238E27FC236}">
+                <a16:creationId xmlns:a16="http://schemas.microsoft.com/office/drawing/2014/main" id="{CE05AE11-3C62-4D6C-8359-1A225B5D9EC6}"/>
+              </a:ext>
+            </a:extLst>
+          </p:cNvPr>
+          <p:cNvSpPr/>
+          <p:nvPr/>
+        </p:nvSpPr>
+        <p:spPr>
+          <a:xfrm>
+            <a:off x="4849280" y="4191324"/>
+            <a:ext cx="695362" cy="239700"/>
+          </a:xfrm>
+          <a:prstGeom prst="rightArrow">
+            <a:avLst>
+              <a:gd name="adj1" fmla="val 0"/>
+              <a:gd name="adj2" fmla="val 87181"/>
+            </a:avLst>
+          </a:prstGeom>
+          <a:solidFill>
+            <a:schemeClr val="accent6">
+              <a:lumMod val="75000"/>
+            </a:schemeClr>
+          </a:solidFill>
+          <a:ln>
+            <a:solidFill>
+              <a:srgbClr val="428479"/>
+            </a:solidFill>
+          </a:ln>
+        </p:spPr>
+        <p:style>
+          <a:lnRef idx="2">
+            <a:schemeClr val="accent1">
+              <a:shade val="50000"/>
+            </a:schemeClr>
+          </a:lnRef>
+          <a:fillRef idx="1">
+            <a:schemeClr val="accent1"/>
+          </a:fillRef>
+          <a:effectRef idx="0">
+            <a:schemeClr val="accent1"/>
+          </a:effectRef>
+          <a:fontRef idx="minor">
+            <a:schemeClr val="lt1"/>
+          </a:fontRef>
+        </p:style>
+        <p:txBody>
+          <a:bodyPr rtlCol="0" anchor="ctr"/>
+          <a:lstStyle/>
+          <a:p>
+            <a:pPr algn="ctr"/>
+            <a:endParaRPr lang="es-ES"/>
+          </a:p>
+        </p:txBody>
+      </p:sp>
+      <p:sp>
+        <p:nvSpPr>
+          <p:cNvPr id="67" name="Flecha: a la derecha 66">
+            <a:extLst>
+              <a:ext uri="{FF2B5EF4-FFF2-40B4-BE49-F238E27FC236}">
+                <a16:creationId xmlns:a16="http://schemas.microsoft.com/office/drawing/2014/main" id="{3A21C75D-25FB-461E-ADEA-E9739BE2935C}"/>
+              </a:ext>
+            </a:extLst>
+          </p:cNvPr>
+          <p:cNvSpPr/>
+          <p:nvPr/>
+        </p:nvSpPr>
+        <p:spPr>
+          <a:xfrm>
+            <a:off x="6205130" y="4191324"/>
+            <a:ext cx="695362" cy="239700"/>
+          </a:xfrm>
+          <a:prstGeom prst="rightArrow">
+            <a:avLst>
+              <a:gd name="adj1" fmla="val 0"/>
+              <a:gd name="adj2" fmla="val 87181"/>
+            </a:avLst>
+          </a:prstGeom>
+          <a:solidFill>
+            <a:schemeClr val="accent6">
+              <a:lumMod val="75000"/>
+            </a:schemeClr>
+          </a:solidFill>
+          <a:ln>
+            <a:solidFill>
+              <a:srgbClr val="428479"/>
+            </a:solidFill>
+          </a:ln>
+        </p:spPr>
+        <p:style>
+          <a:lnRef idx="2">
+            <a:schemeClr val="accent1">
+              <a:shade val="50000"/>
+            </a:schemeClr>
+          </a:lnRef>
+          <a:fillRef idx="1">
+            <a:schemeClr val="accent1"/>
+          </a:fillRef>
+          <a:effectRef idx="0">
+            <a:schemeClr val="accent1"/>
+          </a:effectRef>
+          <a:fontRef idx="minor">
+            <a:schemeClr val="lt1"/>
+          </a:fontRef>
+        </p:style>
+        <p:txBody>
+          <a:bodyPr rtlCol="0" anchor="ctr"/>
+          <a:lstStyle/>
+          <a:p>
+            <a:pPr algn="ctr"/>
+            <a:endParaRPr lang="es-ES"/>
+          </a:p>
+        </p:txBody>
+      </p:sp>
+      <p:sp>
+        <p:nvSpPr>
+          <p:cNvPr id="41" name="CuadroTexto 40">
+            <a:extLst>
+              <a:ext uri="{FF2B5EF4-FFF2-40B4-BE49-F238E27FC236}">
+                <a16:creationId xmlns:a16="http://schemas.microsoft.com/office/drawing/2014/main" id="{786C60F4-E1C5-4F7E-AA72-1B2517D2D1D2}"/>
+              </a:ext>
+            </a:extLst>
+          </p:cNvPr>
+          <p:cNvSpPr txBox="1"/>
+          <p:nvPr/>
+        </p:nvSpPr>
+        <p:spPr>
+          <a:xfrm>
+            <a:off x="7501700" y="4328353"/>
+            <a:ext cx="495649" cy="253916"/>
+          </a:xfrm>
+          <a:prstGeom prst="rect">
+            <a:avLst/>
+          </a:prstGeom>
+          <a:noFill/>
+          <a:ln>
+            <a:noFill/>
+          </a:ln>
+        </p:spPr>
+        <p:txBody>
+          <a:bodyPr wrap="none" rtlCol="0">
+            <a:spAutoFit/>
+          </a:bodyPr>
+          <a:lstStyle/>
+          <a:p>
+            <a:r>
+              <a:rPr lang="es-ES" sz="1050">
+                <a:solidFill>
+                  <a:schemeClr val="accent5">
+                    <a:lumMod val="50000"/>
+                  </a:schemeClr>
+                </a:solidFill>
+              </a:rPr>
+              <a:t>10:00</a:t>
+            </a:r>
+          </a:p>
+        </p:txBody>
+      </p:sp>
+      <p:sp>
+        <p:nvSpPr>
+          <p:cNvPr id="43" name="CuadroTexto 42">
+            <a:extLst>
+              <a:ext uri="{FF2B5EF4-FFF2-40B4-BE49-F238E27FC236}">
+                <a16:creationId xmlns:a16="http://schemas.microsoft.com/office/drawing/2014/main" id="{8BCF2323-3083-46FD-9BAB-263321C05EC5}"/>
+              </a:ext>
+            </a:extLst>
+          </p:cNvPr>
+          <p:cNvSpPr txBox="1"/>
+          <p:nvPr/>
+        </p:nvSpPr>
+        <p:spPr>
+          <a:xfrm>
+            <a:off x="7570280" y="4435033"/>
+            <a:ext cx="495649" cy="253916"/>
+          </a:xfrm>
+          <a:prstGeom prst="rect">
+            <a:avLst/>
+          </a:prstGeom>
+          <a:noFill/>
+          <a:ln>
+            <a:noFill/>
+          </a:ln>
+        </p:spPr>
+        <p:txBody>
+          <a:bodyPr wrap="none" rtlCol="0">
+            <a:spAutoFit/>
+          </a:bodyPr>
+          <a:lstStyle/>
+          <a:p>
+            <a:r>
+              <a:rPr lang="es-ES" sz="1050">
+                <a:solidFill>
+                  <a:schemeClr val="accent5">
+                    <a:lumMod val="75000"/>
+                  </a:schemeClr>
+                </a:solidFill>
+              </a:rPr>
+              <a:t>10:25</a:t>
+            </a:r>
+          </a:p>
+        </p:txBody>
+      </p:sp>
+    </p:spTree>
+    <p:extLst>
+      <p:ext uri="{BB962C8B-B14F-4D97-AF65-F5344CB8AC3E}">
+        <p14:creationId xmlns:p14="http://schemas.microsoft.com/office/powerpoint/2010/main" val="964630263"/>
+      </p:ext>
+    </p:extLst>
+  </p:cSld>
+  <p:clrMapOvr>
+    <a:masterClrMapping/>
+  </p:clrMapOvr>
+</p:sld>
+</file>
+
+<file path=ppt/slides/slide3.xml><?xml version="1.0" encoding="utf-8"?>
+<p:sld xmlns:a="http://schemas.openxmlformats.org/drawingml/2006/main" xmlns:r="http://schemas.openxmlformats.org/officeDocument/2006/relationships" xmlns:p="http://schemas.openxmlformats.org/presentationml/2006/main">
+  <p:cSld>
+    <p:spTree>
+      <p:nvGrpSpPr>
+        <p:cNvPr id="1" name=""/>
+        <p:cNvGrpSpPr/>
+        <p:nvPr/>
+      </p:nvGrpSpPr>
+      <p:grpSpPr>
+        <a:xfrm>
+          <a:off x="0" y="0"/>
+          <a:ext cx="0" cy="0"/>
+          <a:chOff x="0" y="0"/>
+          <a:chExt cx="0" cy="0"/>
+        </a:xfrm>
+      </p:grpSpPr>
+      <p:pic>
+        <p:nvPicPr>
+          <p:cNvPr id="42" name="Imagen 41">
+            <a:extLst>
+              <a:ext uri="{FF2B5EF4-FFF2-40B4-BE49-F238E27FC236}">
+                <a16:creationId xmlns:a16="http://schemas.microsoft.com/office/drawing/2014/main" id="{BF9206E8-53B8-4390-BCE8-30DFE1C28C47}"/>
+              </a:ext>
+            </a:extLst>
+          </p:cNvPr>
+          <p:cNvPicPr>
+            <a:picLocks noChangeAspect="1"/>
+          </p:cNvPicPr>
+          <p:nvPr/>
+        </p:nvPicPr>
+        <p:blipFill>
+          <a:blip r:embed="rId2">
+            <a:alphaModFix amt="20000"/>
+          </a:blip>
+          <a:stretch>
+            <a:fillRect/>
+          </a:stretch>
+        </p:blipFill>
+        <p:spPr>
+          <a:xfrm>
+            <a:off x="2628900" y="723900"/>
+            <a:ext cx="6934200" cy="5410200"/>
+          </a:xfrm>
+          <a:prstGeom prst="rect">
+            <a:avLst/>
+          </a:prstGeom>
+        </p:spPr>
+      </p:pic>
+      <p:cxnSp>
+        <p:nvCxnSpPr>
+          <p:cNvPr id="55" name="Conector recto 54">
+            <a:extLst>
+              <a:ext uri="{FF2B5EF4-FFF2-40B4-BE49-F238E27FC236}">
+                <a16:creationId xmlns:a16="http://schemas.microsoft.com/office/drawing/2014/main" id="{8EF152B4-FB26-49E5-B0A1-F9EAD9ADC745}"/>
+              </a:ext>
+            </a:extLst>
+          </p:cNvPr>
+          <p:cNvCxnSpPr/>
+          <p:nvPr/>
+        </p:nvCxnSpPr>
+        <p:spPr>
+          <a:xfrm>
+            <a:off x="3624552" y="4320699"/>
+            <a:ext cx="801403" cy="0"/>
+          </a:xfrm>
+          <a:prstGeom prst="line">
+            <a:avLst/>
+          </a:prstGeom>
+          <a:ln w="19050">
+            <a:solidFill>
+              <a:srgbClr val="428479"/>
+            </a:solidFill>
+          </a:ln>
+        </p:spPr>
+        <p:style>
+          <a:lnRef idx="1">
+            <a:schemeClr val="accent1"/>
+          </a:lnRef>
+          <a:fillRef idx="0">
+            <a:schemeClr val="accent1"/>
+          </a:fillRef>
+          <a:effectRef idx="0">
+            <a:schemeClr val="accent1"/>
+          </a:effectRef>
+          <a:fontRef idx="minor">
+            <a:schemeClr val="tx1"/>
+          </a:fontRef>
+        </p:style>
+      </p:cxnSp>
+      <p:cxnSp>
+        <p:nvCxnSpPr>
+          <p:cNvPr id="59" name="Conector recto 58">
+            <a:extLst>
+              <a:ext uri="{FF2B5EF4-FFF2-40B4-BE49-F238E27FC236}">
+                <a16:creationId xmlns:a16="http://schemas.microsoft.com/office/drawing/2014/main" id="{5B8A0979-89E6-4CC2-8ADC-DBF4B4A41F13}"/>
+              </a:ext>
+            </a:extLst>
+          </p:cNvPr>
+          <p:cNvCxnSpPr/>
+          <p:nvPr/>
+        </p:nvCxnSpPr>
+        <p:spPr>
+          <a:xfrm>
+            <a:off x="7680329" y="4320699"/>
+            <a:ext cx="468000" cy="0"/>
+          </a:xfrm>
+          <a:prstGeom prst="line">
+            <a:avLst/>
+          </a:prstGeom>
+          <a:ln w="19050">
+            <a:solidFill>
+              <a:srgbClr val="428479"/>
+            </a:solidFill>
+          </a:ln>
+        </p:spPr>
+        <p:style>
+          <a:lnRef idx="1">
+            <a:schemeClr val="accent1"/>
+          </a:lnRef>
+          <a:fillRef idx="0">
+            <a:schemeClr val="accent1"/>
+          </a:fillRef>
+          <a:effectRef idx="0">
+            <a:schemeClr val="accent1"/>
+          </a:effectRef>
+          <a:fontRef idx="minor">
+            <a:schemeClr val="tx1"/>
+          </a:fontRef>
+        </p:style>
+      </p:cxnSp>
+      <p:cxnSp>
+        <p:nvCxnSpPr>
+          <p:cNvPr id="5" name="Conector recto 4">
+            <a:extLst>
+              <a:ext uri="{FF2B5EF4-FFF2-40B4-BE49-F238E27FC236}">
+                <a16:creationId xmlns:a16="http://schemas.microsoft.com/office/drawing/2014/main" id="{F2D939EB-6288-44DB-B576-9416723FAFFD}"/>
+              </a:ext>
+            </a:extLst>
+          </p:cNvPr>
+          <p:cNvCxnSpPr>
+            <a:cxnSpLocks/>
+            <a:stCxn id="4" idx="6"/>
+            <a:endCxn id="50" idx="3"/>
+          </p:cNvCxnSpPr>
+          <p:nvPr/>
+        </p:nvCxnSpPr>
+        <p:spPr>
+          <a:xfrm>
+            <a:off x="4567734" y="4311174"/>
+            <a:ext cx="3047612" cy="1272"/>
+          </a:xfrm>
+          <a:prstGeom prst="line">
+            <a:avLst/>
+          </a:prstGeom>
+          <a:ln w="38100">
+            <a:solidFill>
+              <a:srgbClr val="428479"/>
+            </a:solidFill>
+          </a:ln>
+        </p:spPr>
+        <p:style>
+          <a:lnRef idx="1">
+            <a:schemeClr val="accent1"/>
+          </a:lnRef>
+          <a:fillRef idx="0">
+            <a:schemeClr val="accent1"/>
+          </a:fillRef>
+          <a:effectRef idx="0">
+            <a:schemeClr val="accent1"/>
+          </a:effectRef>
+          <a:fontRef idx="minor">
+            <a:schemeClr val="tx1"/>
+          </a:fontRef>
+        </p:style>
+      </p:cxnSp>
+      <p:sp>
+        <p:nvSpPr>
+          <p:cNvPr id="8" name="CuadroTexto 7">
+            <a:extLst>
+              <a:ext uri="{FF2B5EF4-FFF2-40B4-BE49-F238E27FC236}">
+                <a16:creationId xmlns:a16="http://schemas.microsoft.com/office/drawing/2014/main" id="{ED39C2DF-DE2B-437E-8227-E2F7AC46D17B}"/>
+              </a:ext>
+            </a:extLst>
+          </p:cNvPr>
+          <p:cNvSpPr txBox="1"/>
+          <p:nvPr/>
+        </p:nvSpPr>
+        <p:spPr>
+          <a:xfrm rot="18900000">
+            <a:off x="8091091" y="3860072"/>
+            <a:ext cx="814699" cy="276999"/>
+          </a:xfrm>
+          <a:prstGeom prst="rect">
+            <a:avLst/>
+          </a:prstGeom>
+          <a:noFill/>
+        </p:spPr>
+        <p:txBody>
+          <a:bodyPr vert="horz" wrap="square" rtlCol="0">
+            <a:spAutoFit/>
+          </a:bodyPr>
+          <a:lstStyle/>
+          <a:p>
+            <a:r>
+              <a:rPr lang="es-ES" sz="1200"/>
+              <a:t>Can </a:t>
+            </a:r>
+            <a:r>
+              <a:rPr lang="es-ES" sz="1200" err="1"/>
+              <a:t>Rosés</a:t>
+            </a:r>
+            <a:endParaRPr lang="es-ES" sz="1200"/>
+          </a:p>
+        </p:txBody>
+      </p:sp>
+      <p:sp>
+        <p:nvSpPr>
+          <p:cNvPr id="12" name="CuadroTexto 11">
+            <a:extLst>
+              <a:ext uri="{FF2B5EF4-FFF2-40B4-BE49-F238E27FC236}">
+                <a16:creationId xmlns:a16="http://schemas.microsoft.com/office/drawing/2014/main" id="{7C4468ED-A4DC-4AF8-9658-38017BE944A7}"/>
+              </a:ext>
+            </a:extLst>
+          </p:cNvPr>
+          <p:cNvSpPr txBox="1"/>
+          <p:nvPr/>
+        </p:nvSpPr>
+        <p:spPr>
+          <a:xfrm rot="18900000">
+            <a:off x="3499983" y="4589696"/>
+            <a:ext cx="1169689" cy="276999"/>
+          </a:xfrm>
+          <a:prstGeom prst="rect">
+            <a:avLst/>
+          </a:prstGeom>
+          <a:noFill/>
+        </p:spPr>
+        <p:txBody>
+          <a:bodyPr vert="horz" wrap="square" rtlCol="0">
+            <a:spAutoFit/>
+          </a:bodyPr>
+          <a:lstStyle/>
+          <a:p>
+            <a:r>
+              <a:rPr lang="es-ES" sz="1200" err="1"/>
+              <a:t>Països</a:t>
+            </a:r>
+            <a:r>
+              <a:rPr lang="es-ES" sz="1200"/>
+              <a:t> </a:t>
+            </a:r>
+            <a:r>
+              <a:rPr lang="es-ES" sz="1200" err="1"/>
+              <a:t>Catalans</a:t>
+            </a:r>
+            <a:endParaRPr lang="es-ES" sz="1200"/>
+          </a:p>
+        </p:txBody>
+      </p:sp>
+      <p:cxnSp>
+        <p:nvCxnSpPr>
+          <p:cNvPr id="13" name="Conector recto 12">
+            <a:extLst>
+              <a:ext uri="{FF2B5EF4-FFF2-40B4-BE49-F238E27FC236}">
+                <a16:creationId xmlns:a16="http://schemas.microsoft.com/office/drawing/2014/main" id="{18EA2F74-30A9-46E7-8273-3DC30763DE4F}"/>
+              </a:ext>
+            </a:extLst>
+          </p:cNvPr>
+          <p:cNvCxnSpPr>
+            <a:cxnSpLocks/>
+            <a:endCxn id="46" idx="2"/>
+          </p:cNvCxnSpPr>
+          <p:nvPr/>
+        </p:nvCxnSpPr>
+        <p:spPr>
+          <a:xfrm flipV="1">
+            <a:off x="5076825" y="3936723"/>
+            <a:ext cx="1910222" cy="2976"/>
+          </a:xfrm>
+          <a:prstGeom prst="line">
+            <a:avLst/>
+          </a:prstGeom>
+          <a:ln w="38100">
+            <a:solidFill>
+              <a:schemeClr val="accent1"/>
+            </a:solidFill>
+          </a:ln>
+        </p:spPr>
+        <p:style>
+          <a:lnRef idx="1">
+            <a:schemeClr val="accent1"/>
+          </a:lnRef>
+          <a:fillRef idx="0">
+            <a:schemeClr val="accent1"/>
+          </a:fillRef>
+          <a:effectRef idx="0">
+            <a:schemeClr val="accent1"/>
+          </a:effectRef>
+          <a:fontRef idx="minor">
+            <a:schemeClr val="tx1"/>
+          </a:fontRef>
+        </p:style>
+      </p:cxnSp>
+      <p:cxnSp>
+        <p:nvCxnSpPr>
+          <p:cNvPr id="14" name="Conector recto 13">
+            <a:extLst>
+              <a:ext uri="{FF2B5EF4-FFF2-40B4-BE49-F238E27FC236}">
+                <a16:creationId xmlns:a16="http://schemas.microsoft.com/office/drawing/2014/main" id="{7D985ACF-4A1B-47B2-A59E-91A175778F6A}"/>
+              </a:ext>
+            </a:extLst>
+          </p:cNvPr>
+          <p:cNvCxnSpPr>
+            <a:cxnSpLocks/>
+            <a:stCxn id="4" idx="7"/>
+            <a:endCxn id="27" idx="2"/>
+          </p:cNvCxnSpPr>
+          <p:nvPr/>
+        </p:nvCxnSpPr>
+        <p:spPr>
+          <a:xfrm flipV="1">
+            <a:off x="4546646" y="3939835"/>
+            <a:ext cx="530179" cy="320427"/>
+          </a:xfrm>
+          <a:prstGeom prst="line">
+            <a:avLst/>
+          </a:prstGeom>
+          <a:ln w="38100">
+            <a:solidFill>
+              <a:schemeClr val="accent1"/>
+            </a:solidFill>
+          </a:ln>
+        </p:spPr>
+        <p:style>
+          <a:lnRef idx="1">
+            <a:schemeClr val="accent1"/>
+          </a:lnRef>
+          <a:fillRef idx="0">
+            <a:schemeClr val="accent1"/>
+          </a:fillRef>
+          <a:effectRef idx="0">
+            <a:schemeClr val="accent1"/>
+          </a:effectRef>
+          <a:fontRef idx="minor">
+            <a:schemeClr val="tx1"/>
+          </a:fontRef>
+        </p:style>
+      </p:cxnSp>
+      <p:sp>
+        <p:nvSpPr>
+          <p:cNvPr id="27" name="Elipse 26">
+            <a:extLst>
+              <a:ext uri="{FF2B5EF4-FFF2-40B4-BE49-F238E27FC236}">
+                <a16:creationId xmlns:a16="http://schemas.microsoft.com/office/drawing/2014/main" id="{E96BF921-A172-42C7-9D64-A5EAE60665A8}"/>
+              </a:ext>
+            </a:extLst>
+          </p:cNvPr>
+          <p:cNvSpPr/>
+          <p:nvPr/>
+        </p:nvSpPr>
+        <p:spPr>
+          <a:xfrm>
+            <a:off x="5076825" y="3885835"/>
+            <a:ext cx="108000" cy="108000"/>
+          </a:xfrm>
+          <a:prstGeom prst="ellipse">
+            <a:avLst/>
+          </a:prstGeom>
+          <a:solidFill>
+            <a:schemeClr val="accent5">
+              <a:lumMod val="60000"/>
+              <a:lumOff val="40000"/>
+            </a:schemeClr>
+          </a:solidFill>
+          <a:ln>
+            <a:solidFill>
+              <a:srgbClr val="0070C0"/>
+            </a:solidFill>
+          </a:ln>
+        </p:spPr>
+        <p:style>
+          <a:lnRef idx="2">
+            <a:schemeClr val="accent1">
+              <a:shade val="50000"/>
+            </a:schemeClr>
+          </a:lnRef>
+          <a:fillRef idx="1">
+            <a:schemeClr val="accent1"/>
+          </a:fillRef>
+          <a:effectRef idx="0">
+            <a:schemeClr val="accent1"/>
+          </a:effectRef>
+          <a:fontRef idx="minor">
+            <a:schemeClr val="lt1"/>
+          </a:fontRef>
+        </p:style>
+        <p:txBody>
+          <a:bodyPr rtlCol="0" anchor="ctr"/>
+          <a:lstStyle/>
+          <a:p>
+            <a:pPr algn="ctr"/>
+            <a:endParaRPr lang="es-ES"/>
+          </a:p>
+        </p:txBody>
+      </p:sp>
+      <p:sp>
+        <p:nvSpPr>
+          <p:cNvPr id="28" name="Elipse 27">
+            <a:extLst>
+              <a:ext uri="{FF2B5EF4-FFF2-40B4-BE49-F238E27FC236}">
+                <a16:creationId xmlns:a16="http://schemas.microsoft.com/office/drawing/2014/main" id="{D5F66B02-563E-4D17-8A77-7593C5DAA88C}"/>
+              </a:ext>
+            </a:extLst>
+          </p:cNvPr>
+          <p:cNvSpPr/>
+          <p:nvPr/>
+        </p:nvSpPr>
+        <p:spPr>
+          <a:xfrm>
+            <a:off x="7569154" y="4260262"/>
+            <a:ext cx="108000" cy="108000"/>
+          </a:xfrm>
+          <a:prstGeom prst="ellipse">
+            <a:avLst/>
+          </a:prstGeom>
+          <a:solidFill>
+            <a:schemeClr val="accent6">
+              <a:lumMod val="75000"/>
+            </a:schemeClr>
+          </a:solidFill>
+          <a:ln>
+            <a:solidFill>
+              <a:schemeClr val="accent6">
+                <a:lumMod val="60000"/>
+                <a:lumOff val="40000"/>
+              </a:schemeClr>
+            </a:solidFill>
+          </a:ln>
+        </p:spPr>
+        <p:style>
+          <a:lnRef idx="2">
+            <a:schemeClr val="accent1">
+              <a:shade val="50000"/>
+            </a:schemeClr>
+          </a:lnRef>
+          <a:fillRef idx="1">
+            <a:schemeClr val="accent1"/>
+          </a:fillRef>
+          <a:effectRef idx="0">
+            <a:schemeClr val="accent1"/>
+          </a:effectRef>
+          <a:fontRef idx="minor">
+            <a:schemeClr val="lt1"/>
+          </a:fontRef>
+        </p:style>
+        <p:txBody>
+          <a:bodyPr rtlCol="0" anchor="ctr"/>
+          <a:lstStyle/>
+          <a:p>
+            <a:pPr algn="ctr"/>
+            <a:endParaRPr lang="es-ES"/>
+          </a:p>
+        </p:txBody>
+      </p:sp>
+      <p:sp>
+        <p:nvSpPr>
+          <p:cNvPr id="37" name="CuadroTexto 36">
+            <a:extLst>
+              <a:ext uri="{FF2B5EF4-FFF2-40B4-BE49-F238E27FC236}">
+                <a16:creationId xmlns:a16="http://schemas.microsoft.com/office/drawing/2014/main" id="{94B162C1-1477-4FA2-AC42-7A36CD6A768A}"/>
+              </a:ext>
+            </a:extLst>
+          </p:cNvPr>
+          <p:cNvSpPr txBox="1"/>
+          <p:nvPr/>
+        </p:nvSpPr>
+        <p:spPr>
+          <a:xfrm rot="18900000">
+            <a:off x="3387815" y="3767493"/>
+            <a:ext cx="1112469" cy="276999"/>
+          </a:xfrm>
+          <a:prstGeom prst="rect">
+            <a:avLst/>
+          </a:prstGeom>
+          <a:noFill/>
+        </p:spPr>
+        <p:txBody>
+          <a:bodyPr vert="horz" wrap="square" rtlCol="0">
+            <a:spAutoFit/>
+          </a:bodyPr>
+          <a:lstStyle/>
+          <a:p>
+            <a:r>
+              <a:rPr lang="es-ES" sz="1200" err="1"/>
+              <a:t>Estació</a:t>
+            </a:r>
+            <a:r>
+              <a:rPr lang="es-ES" sz="1200"/>
+              <a:t> </a:t>
+            </a:r>
+            <a:r>
+              <a:rPr lang="es-ES" sz="1200" err="1"/>
+              <a:t>RubÍ+D</a:t>
+            </a:r>
+            <a:endParaRPr lang="es-ES" sz="1200"/>
+          </a:p>
+        </p:txBody>
+      </p:sp>
+      <p:sp>
+        <p:nvSpPr>
+          <p:cNvPr id="40" name="CuadroTexto 39">
+            <a:extLst>
+              <a:ext uri="{FF2B5EF4-FFF2-40B4-BE49-F238E27FC236}">
+                <a16:creationId xmlns:a16="http://schemas.microsoft.com/office/drawing/2014/main" id="{BC391A74-93B0-4394-A365-B0074DB473D3}"/>
+              </a:ext>
+            </a:extLst>
+          </p:cNvPr>
+          <p:cNvSpPr txBox="1"/>
+          <p:nvPr/>
+        </p:nvSpPr>
+        <p:spPr>
+          <a:xfrm>
+            <a:off x="6873646" y="352425"/>
+            <a:ext cx="2689454" cy="369332"/>
+          </a:xfrm>
+          <a:prstGeom prst="rect">
+            <a:avLst/>
+          </a:prstGeom>
+          <a:noFill/>
+        </p:spPr>
+        <p:txBody>
+          <a:bodyPr wrap="none" rtlCol="0">
+            <a:spAutoFit/>
+          </a:bodyPr>
+          <a:lstStyle/>
+          <a:p>
+            <a:r>
+              <a:rPr lang="es-ES"/>
+              <a:t>Transporte urbano de Rubí</a:t>
+            </a:r>
+          </a:p>
+        </p:txBody>
+      </p:sp>
+      <p:cxnSp>
+        <p:nvCxnSpPr>
+          <p:cNvPr id="45" name="Conector recto 44">
+            <a:extLst>
+              <a:ext uri="{FF2B5EF4-FFF2-40B4-BE49-F238E27FC236}">
+                <a16:creationId xmlns:a16="http://schemas.microsoft.com/office/drawing/2014/main" id="{1CC32BA5-3B8B-4E7D-BA1B-74CF334AEBB1}"/>
+              </a:ext>
+            </a:extLst>
+          </p:cNvPr>
+          <p:cNvCxnSpPr>
+            <a:cxnSpLocks/>
+            <a:stCxn id="28" idx="1"/>
+            <a:endCxn id="46" idx="6"/>
+          </p:cNvCxnSpPr>
+          <p:nvPr/>
+        </p:nvCxnSpPr>
+        <p:spPr>
+          <a:xfrm flipH="1" flipV="1">
+            <a:off x="7095047" y="3936723"/>
+            <a:ext cx="489923" cy="339355"/>
+          </a:xfrm>
+          <a:prstGeom prst="line">
+            <a:avLst/>
+          </a:prstGeom>
+          <a:ln w="38100">
+            <a:solidFill>
+              <a:schemeClr val="accent1"/>
+            </a:solidFill>
+          </a:ln>
+        </p:spPr>
+        <p:style>
+          <a:lnRef idx="1">
+            <a:schemeClr val="accent1"/>
+          </a:lnRef>
+          <a:fillRef idx="0">
+            <a:schemeClr val="accent1"/>
+          </a:fillRef>
+          <a:effectRef idx="0">
+            <a:schemeClr val="accent1"/>
+          </a:effectRef>
+          <a:fontRef idx="minor">
+            <a:schemeClr val="tx1"/>
+          </a:fontRef>
+        </p:style>
+      </p:cxnSp>
+      <p:sp>
+        <p:nvSpPr>
+          <p:cNvPr id="46" name="Elipse 45">
+            <a:extLst>
+              <a:ext uri="{FF2B5EF4-FFF2-40B4-BE49-F238E27FC236}">
+                <a16:creationId xmlns:a16="http://schemas.microsoft.com/office/drawing/2014/main" id="{E96BAD64-012C-4C71-8245-503DBEA2F866}"/>
+              </a:ext>
+            </a:extLst>
+          </p:cNvPr>
+          <p:cNvSpPr/>
+          <p:nvPr/>
+        </p:nvSpPr>
+        <p:spPr>
+          <a:xfrm>
+            <a:off x="6987047" y="3882723"/>
+            <a:ext cx="108000" cy="108000"/>
+          </a:xfrm>
+          <a:prstGeom prst="ellipse">
+            <a:avLst/>
+          </a:prstGeom>
+          <a:solidFill>
+            <a:schemeClr val="accent5">
+              <a:lumMod val="60000"/>
+              <a:lumOff val="40000"/>
+            </a:schemeClr>
+          </a:solidFill>
+          <a:ln>
+            <a:solidFill>
+              <a:srgbClr val="0070C0"/>
+            </a:solidFill>
+          </a:ln>
+        </p:spPr>
+        <p:style>
+          <a:lnRef idx="2">
+            <a:schemeClr val="accent1">
+              <a:shade val="50000"/>
+            </a:schemeClr>
+          </a:lnRef>
+          <a:fillRef idx="1">
+            <a:schemeClr val="accent1"/>
+          </a:fillRef>
+          <a:effectRef idx="0">
+            <a:schemeClr val="accent1"/>
+          </a:effectRef>
+          <a:fontRef idx="minor">
+            <a:schemeClr val="lt1"/>
+          </a:fontRef>
+        </p:style>
+        <p:txBody>
+          <a:bodyPr rtlCol="0" anchor="ctr"/>
+          <a:lstStyle/>
+          <a:p>
+            <a:pPr algn="ctr"/>
+            <a:endParaRPr lang="es-ES"/>
+          </a:p>
+        </p:txBody>
+      </p:sp>
+      <p:sp>
+        <p:nvSpPr>
+          <p:cNvPr id="50" name="CuadroTexto 49">
+            <a:extLst>
+              <a:ext uri="{FF2B5EF4-FFF2-40B4-BE49-F238E27FC236}">
+                <a16:creationId xmlns:a16="http://schemas.microsoft.com/office/drawing/2014/main" id="{7CBE6323-2EC6-4401-8E7A-CCCE8D9733C2}"/>
+              </a:ext>
+            </a:extLst>
+          </p:cNvPr>
+          <p:cNvSpPr txBox="1"/>
+          <p:nvPr/>
+        </p:nvSpPr>
+        <p:spPr>
+          <a:xfrm rot="18900000">
+            <a:off x="7050253" y="4408015"/>
+            <a:ext cx="662047" cy="276999"/>
+          </a:xfrm>
+          <a:prstGeom prst="rect">
+            <a:avLst/>
+          </a:prstGeom>
+          <a:noFill/>
+        </p:spPr>
+        <p:txBody>
+          <a:bodyPr vert="horz" wrap="square" rtlCol="0">
+            <a:spAutoFit/>
+          </a:bodyPr>
+          <a:lstStyle/>
+          <a:p>
+            <a:r>
+              <a:rPr lang="es-ES" sz="1200" err="1"/>
+              <a:t>Els</a:t>
+            </a:r>
+            <a:r>
+              <a:rPr lang="es-ES" sz="1200"/>
+              <a:t> </a:t>
+            </a:r>
+            <a:r>
+              <a:rPr lang="es-ES" sz="1200" err="1"/>
+              <a:t>Nius</a:t>
+            </a:r>
+            <a:endParaRPr lang="es-ES" sz="1200"/>
+          </a:p>
+        </p:txBody>
+      </p:sp>
+      <p:cxnSp>
+        <p:nvCxnSpPr>
+          <p:cNvPr id="54" name="Conector recto 53">
+            <a:extLst>
+              <a:ext uri="{FF2B5EF4-FFF2-40B4-BE49-F238E27FC236}">
+                <a16:creationId xmlns:a16="http://schemas.microsoft.com/office/drawing/2014/main" id="{9ABE7EDF-F0E8-44E4-8F11-2E4B68A91541}"/>
+              </a:ext>
+            </a:extLst>
+          </p:cNvPr>
+          <p:cNvCxnSpPr/>
+          <p:nvPr/>
+        </p:nvCxnSpPr>
+        <p:spPr>
+          <a:xfrm>
+            <a:off x="3624552" y="4301649"/>
+            <a:ext cx="801403" cy="0"/>
+          </a:xfrm>
+          <a:prstGeom prst="line">
+            <a:avLst/>
+          </a:prstGeom>
+          <a:ln w="19050">
+            <a:solidFill>
+              <a:schemeClr val="accent1"/>
+            </a:solidFill>
+          </a:ln>
+        </p:spPr>
+        <p:style>
+          <a:lnRef idx="1">
+            <a:schemeClr val="accent1"/>
+          </a:lnRef>
+          <a:fillRef idx="0">
+            <a:schemeClr val="accent1"/>
+          </a:fillRef>
+          <a:effectRef idx="0">
+            <a:schemeClr val="accent1"/>
+          </a:effectRef>
+          <a:fontRef idx="minor">
+            <a:schemeClr val="tx1"/>
+          </a:fontRef>
+        </p:style>
+      </p:cxnSp>
+      <p:sp>
+        <p:nvSpPr>
+          <p:cNvPr id="4" name="Elipse 3">
+            <a:extLst>
+              <a:ext uri="{FF2B5EF4-FFF2-40B4-BE49-F238E27FC236}">
+                <a16:creationId xmlns:a16="http://schemas.microsoft.com/office/drawing/2014/main" id="{9236991A-A978-42AF-830A-DE2C1D52F5E6}"/>
+              </a:ext>
+            </a:extLst>
+          </p:cNvPr>
+          <p:cNvSpPr/>
+          <p:nvPr/>
+        </p:nvSpPr>
+        <p:spPr>
+          <a:xfrm>
+            <a:off x="4423734" y="4239174"/>
+            <a:ext cx="144000" cy="144000"/>
+          </a:xfrm>
+          <a:prstGeom prst="ellipse">
+            <a:avLst/>
+          </a:prstGeom>
+          <a:solidFill>
+            <a:schemeClr val="accent4">
+              <a:lumMod val="60000"/>
+              <a:lumOff val="40000"/>
+            </a:schemeClr>
+          </a:solidFill>
+        </p:spPr>
+        <p:style>
+          <a:lnRef idx="2">
+            <a:schemeClr val="accent1">
+              <a:shade val="50000"/>
+            </a:schemeClr>
+          </a:lnRef>
+          <a:fillRef idx="1">
+            <a:schemeClr val="accent1"/>
+          </a:fillRef>
+          <a:effectRef idx="0">
+            <a:schemeClr val="accent1"/>
+          </a:effectRef>
+          <a:fontRef idx="minor">
+            <a:schemeClr val="lt1"/>
+          </a:fontRef>
+        </p:style>
+        <p:txBody>
+          <a:bodyPr rtlCol="0" anchor="ctr"/>
+          <a:lstStyle/>
+          <a:p>
+            <a:pPr algn="ctr"/>
+            <a:endParaRPr lang="es-ES"/>
+          </a:p>
+        </p:txBody>
+      </p:sp>
+      <p:sp>
+        <p:nvSpPr>
+          <p:cNvPr id="38" name="Elipse 37">
+            <a:extLst>
+              <a:ext uri="{FF2B5EF4-FFF2-40B4-BE49-F238E27FC236}">
+                <a16:creationId xmlns:a16="http://schemas.microsoft.com/office/drawing/2014/main" id="{A05398E5-AA1C-44C5-8F21-66E6D7B710B2}"/>
+              </a:ext>
+            </a:extLst>
+          </p:cNvPr>
+          <p:cNvSpPr/>
+          <p:nvPr/>
+        </p:nvSpPr>
+        <p:spPr>
+          <a:xfrm>
+            <a:off x="3479065" y="4239174"/>
+            <a:ext cx="144000" cy="144000"/>
+          </a:xfrm>
+          <a:prstGeom prst="ellipse">
+            <a:avLst/>
+          </a:prstGeom>
+          <a:solidFill>
+            <a:schemeClr val="accent4">
+              <a:lumMod val="60000"/>
+              <a:lumOff val="40000"/>
+            </a:schemeClr>
+          </a:solidFill>
+        </p:spPr>
+        <p:style>
+          <a:lnRef idx="2">
+            <a:schemeClr val="accent1">
+              <a:shade val="50000"/>
+            </a:schemeClr>
+          </a:lnRef>
+          <a:fillRef idx="1">
+            <a:schemeClr val="accent1"/>
+          </a:fillRef>
+          <a:effectRef idx="0">
+            <a:schemeClr val="accent1"/>
+          </a:effectRef>
+          <a:fontRef idx="minor">
+            <a:schemeClr val="lt1"/>
+          </a:fontRef>
+        </p:style>
+        <p:txBody>
+          <a:bodyPr rtlCol="0" anchor="ctr"/>
+          <a:lstStyle/>
+          <a:p>
+            <a:pPr algn="ctr"/>
+            <a:endParaRPr lang="es-ES"/>
+          </a:p>
+        </p:txBody>
+      </p:sp>
+      <p:cxnSp>
+        <p:nvCxnSpPr>
+          <p:cNvPr id="58" name="Conector recto 57">
+            <a:extLst>
+              <a:ext uri="{FF2B5EF4-FFF2-40B4-BE49-F238E27FC236}">
+                <a16:creationId xmlns:a16="http://schemas.microsoft.com/office/drawing/2014/main" id="{15525BA1-0F25-483A-9CEA-C13F90B36C09}"/>
+              </a:ext>
+            </a:extLst>
+          </p:cNvPr>
+          <p:cNvCxnSpPr/>
+          <p:nvPr/>
+        </p:nvCxnSpPr>
+        <p:spPr>
+          <a:xfrm>
+            <a:off x="7680329" y="4301649"/>
+            <a:ext cx="468000" cy="0"/>
+          </a:xfrm>
+          <a:prstGeom prst="line">
+            <a:avLst/>
+          </a:prstGeom>
+          <a:ln w="19050">
+            <a:solidFill>
+              <a:schemeClr val="accent1"/>
+            </a:solidFill>
+          </a:ln>
+        </p:spPr>
+        <p:style>
+          <a:lnRef idx="1">
+            <a:schemeClr val="accent1"/>
+          </a:lnRef>
+          <a:fillRef idx="0">
+            <a:schemeClr val="accent1"/>
+          </a:fillRef>
+          <a:effectRef idx="0">
+            <a:schemeClr val="accent1"/>
+          </a:effectRef>
+          <a:fontRef idx="minor">
+            <a:schemeClr val="tx1"/>
+          </a:fontRef>
+        </p:style>
+      </p:cxnSp>
+      <p:sp>
+        <p:nvSpPr>
+          <p:cNvPr id="10" name="Elipse 9">
+            <a:extLst>
+              <a:ext uri="{FF2B5EF4-FFF2-40B4-BE49-F238E27FC236}">
+                <a16:creationId xmlns:a16="http://schemas.microsoft.com/office/drawing/2014/main" id="{6CAA1851-E736-427E-891B-8B5F3C9E19B1}"/>
+              </a:ext>
+            </a:extLst>
+          </p:cNvPr>
+          <p:cNvSpPr/>
+          <p:nvPr/>
+        </p:nvSpPr>
+        <p:spPr>
+          <a:xfrm>
+            <a:off x="8151249" y="4239174"/>
+            <a:ext cx="144000" cy="144000"/>
+          </a:xfrm>
+          <a:prstGeom prst="ellipse">
+            <a:avLst/>
+          </a:prstGeom>
+          <a:solidFill>
+            <a:schemeClr val="accent4">
+              <a:lumMod val="60000"/>
+              <a:lumOff val="40000"/>
+            </a:schemeClr>
+          </a:solidFill>
+        </p:spPr>
+        <p:style>
+          <a:lnRef idx="2">
+            <a:schemeClr val="accent1">
+              <a:shade val="50000"/>
+            </a:schemeClr>
+          </a:lnRef>
+          <a:fillRef idx="1">
+            <a:schemeClr val="accent1"/>
+          </a:fillRef>
+          <a:effectRef idx="0">
+            <a:schemeClr val="accent1"/>
+          </a:effectRef>
+          <a:fontRef idx="minor">
+            <a:schemeClr val="lt1"/>
+          </a:fontRef>
+        </p:style>
+        <p:txBody>
+          <a:bodyPr rtlCol="0" anchor="ctr"/>
+          <a:lstStyle/>
+          <a:p>
+            <a:pPr algn="ctr"/>
+            <a:endParaRPr lang="es-ES"/>
+          </a:p>
+        </p:txBody>
+      </p:sp>
+      <p:sp>
+        <p:nvSpPr>
+          <p:cNvPr id="68" name="Flecha: a la derecha 67">
+            <a:extLst>
+              <a:ext uri="{FF2B5EF4-FFF2-40B4-BE49-F238E27FC236}">
+                <a16:creationId xmlns:a16="http://schemas.microsoft.com/office/drawing/2014/main" id="{B4A64CB9-41B9-449A-88CA-44462C36F935}"/>
+              </a:ext>
+            </a:extLst>
+          </p:cNvPr>
+          <p:cNvSpPr/>
+          <p:nvPr/>
+        </p:nvSpPr>
+        <p:spPr>
+          <a:xfrm flipH="1">
+            <a:off x="5928877" y="3813414"/>
+            <a:ext cx="695362" cy="239700"/>
+          </a:xfrm>
+          <a:prstGeom prst="rightArrow">
+            <a:avLst>
+              <a:gd name="adj1" fmla="val 0"/>
+              <a:gd name="adj2" fmla="val 87181"/>
+            </a:avLst>
+          </a:prstGeom>
+          <a:solidFill>
+            <a:schemeClr val="accent5">
+              <a:lumMod val="60000"/>
+              <a:lumOff val="40000"/>
+            </a:schemeClr>
+          </a:solidFill>
+          <a:ln>
+            <a:solidFill>
+              <a:schemeClr val="accent1"/>
+            </a:solidFill>
+          </a:ln>
+        </p:spPr>
+        <p:style>
+          <a:lnRef idx="2">
+            <a:schemeClr val="accent1">
+              <a:shade val="50000"/>
+            </a:schemeClr>
+          </a:lnRef>
+          <a:fillRef idx="1">
+            <a:schemeClr val="accent1"/>
+          </a:fillRef>
+          <a:effectRef idx="0">
+            <a:schemeClr val="accent1"/>
+          </a:effectRef>
+          <a:fontRef idx="minor">
+            <a:schemeClr val="lt1"/>
+          </a:fontRef>
+        </p:style>
+        <p:txBody>
+          <a:bodyPr rtlCol="0" anchor="ctr"/>
+          <a:lstStyle/>
+          <a:p>
+            <a:pPr algn="ctr"/>
+            <a:endParaRPr lang="es-ES"/>
+          </a:p>
+        </p:txBody>
+      </p:sp>
+      <p:sp>
+        <p:nvSpPr>
+          <p:cNvPr id="66" name="Flecha: a la derecha 65">
+            <a:extLst>
+              <a:ext uri="{FF2B5EF4-FFF2-40B4-BE49-F238E27FC236}">
+                <a16:creationId xmlns:a16="http://schemas.microsoft.com/office/drawing/2014/main" id="{CE05AE11-3C62-4D6C-8359-1A225B5D9EC6}"/>
+              </a:ext>
+            </a:extLst>
+          </p:cNvPr>
+          <p:cNvSpPr/>
+          <p:nvPr/>
+        </p:nvSpPr>
+        <p:spPr>
+          <a:xfrm>
+            <a:off x="4849280" y="4191324"/>
+            <a:ext cx="695362" cy="239700"/>
+          </a:xfrm>
+          <a:prstGeom prst="rightArrow">
+            <a:avLst>
+              <a:gd name="adj1" fmla="val 0"/>
+              <a:gd name="adj2" fmla="val 87181"/>
+            </a:avLst>
+          </a:prstGeom>
+          <a:solidFill>
+            <a:schemeClr val="accent6">
+              <a:lumMod val="75000"/>
+            </a:schemeClr>
+          </a:solidFill>
+          <a:ln>
+            <a:solidFill>
+              <a:srgbClr val="428479"/>
+            </a:solidFill>
+          </a:ln>
+        </p:spPr>
+        <p:style>
+          <a:lnRef idx="2">
+            <a:schemeClr val="accent1">
+              <a:shade val="50000"/>
+            </a:schemeClr>
+          </a:lnRef>
+          <a:fillRef idx="1">
+            <a:schemeClr val="accent1"/>
+          </a:fillRef>
+          <a:effectRef idx="0">
+            <a:schemeClr val="accent1"/>
+          </a:effectRef>
+          <a:fontRef idx="minor">
+            <a:schemeClr val="lt1"/>
+          </a:fontRef>
+        </p:style>
+        <p:txBody>
+          <a:bodyPr rtlCol="0" anchor="ctr"/>
+          <a:lstStyle/>
+          <a:p>
+            <a:pPr algn="ctr"/>
+            <a:endParaRPr lang="es-ES"/>
+          </a:p>
+        </p:txBody>
+      </p:sp>
+      <p:sp>
+        <p:nvSpPr>
+          <p:cNvPr id="67" name="Flecha: a la derecha 66">
+            <a:extLst>
+              <a:ext uri="{FF2B5EF4-FFF2-40B4-BE49-F238E27FC236}">
+                <a16:creationId xmlns:a16="http://schemas.microsoft.com/office/drawing/2014/main" id="{3A21C75D-25FB-461E-ADEA-E9739BE2935C}"/>
+              </a:ext>
+            </a:extLst>
+          </p:cNvPr>
+          <p:cNvSpPr/>
+          <p:nvPr/>
+        </p:nvSpPr>
+        <p:spPr>
+          <a:xfrm>
+            <a:off x="6205130" y="4191324"/>
+            <a:ext cx="695362" cy="239700"/>
+          </a:xfrm>
+          <a:prstGeom prst="rightArrow">
+            <a:avLst>
+              <a:gd name="adj1" fmla="val 0"/>
+              <a:gd name="adj2" fmla="val 87181"/>
+            </a:avLst>
+          </a:prstGeom>
+          <a:solidFill>
+            <a:schemeClr val="accent6">
+              <a:lumMod val="75000"/>
+            </a:schemeClr>
+          </a:solidFill>
+          <a:ln>
+            <a:solidFill>
+              <a:srgbClr val="428479"/>
+            </a:solidFill>
+          </a:ln>
+        </p:spPr>
+        <p:style>
+          <a:lnRef idx="2">
+            <a:schemeClr val="accent1">
+              <a:shade val="50000"/>
+            </a:schemeClr>
+          </a:lnRef>
+          <a:fillRef idx="1">
+            <a:schemeClr val="accent1"/>
+          </a:fillRef>
+          <a:effectRef idx="0">
+            <a:schemeClr val="accent1"/>
+          </a:effectRef>
+          <a:fontRef idx="minor">
+            <a:schemeClr val="lt1"/>
+          </a:fontRef>
+        </p:style>
+        <p:txBody>
+          <a:bodyPr rtlCol="0" anchor="ctr"/>
+          <a:lstStyle/>
+          <a:p>
+            <a:pPr algn="ctr"/>
+            <a:endParaRPr lang="es-ES"/>
+          </a:p>
+        </p:txBody>
+      </p:sp>
+    </p:spTree>
+    <p:extLst>
+      <p:ext uri="{BB962C8B-B14F-4D97-AF65-F5344CB8AC3E}">
+        <p14:creationId xmlns:p14="http://schemas.microsoft.com/office/powerpoint/2010/main" val="2634334257"/>
+      </p:ext>
+    </p:extLst>
+  </p:cSld>
+  <p:clrMapOvr>
+    <a:masterClrMapping/>
+  </p:clrMapOvr>
+</p:sld>
+</file>
+
+<file path=ppt/slides/slide4.xml><?xml version="1.0" encoding="utf-8"?>
+<p:sld xmlns:a="http://schemas.openxmlformats.org/drawingml/2006/main" xmlns:r="http://schemas.openxmlformats.org/officeDocument/2006/relationships" xmlns:p="http://schemas.openxmlformats.org/presentationml/2006/main">
+  <p:cSld>
+    <p:spTree>
+      <p:nvGrpSpPr>
+        <p:cNvPr id="1" name=""/>
+        <p:cNvGrpSpPr/>
+        <p:nvPr/>
+      </p:nvGrpSpPr>
+      <p:grpSpPr>
+        <a:xfrm>
+          <a:off x="0" y="0"/>
+          <a:ext cx="0" cy="0"/>
+          <a:chOff x="0" y="0"/>
+          <a:chExt cx="0" cy="0"/>
+        </a:xfrm>
+      </p:grpSpPr>
+      <p:pic>
+        <p:nvPicPr>
+          <p:cNvPr id="42" name="Imagen 41">
+            <a:extLst>
+              <a:ext uri="{FF2B5EF4-FFF2-40B4-BE49-F238E27FC236}">
+                <a16:creationId xmlns:a16="http://schemas.microsoft.com/office/drawing/2014/main" id="{BF9206E8-53B8-4390-BCE8-30DFE1C28C47}"/>
+              </a:ext>
+            </a:extLst>
+          </p:cNvPr>
+          <p:cNvPicPr>
+            <a:picLocks noChangeAspect="1"/>
+          </p:cNvPicPr>
+          <p:nvPr/>
+        </p:nvPicPr>
+        <p:blipFill>
+          <a:blip r:embed="rId2">
+            <a:alphaModFix amt="20000"/>
+          </a:blip>
+          <a:stretch>
+            <a:fillRect/>
+          </a:stretch>
+        </p:blipFill>
+        <p:spPr>
+          <a:xfrm>
+            <a:off x="2628900" y="723900"/>
+            <a:ext cx="6934200" cy="5410200"/>
+          </a:xfrm>
+          <a:prstGeom prst="rect">
+            <a:avLst/>
+          </a:prstGeom>
+        </p:spPr>
+      </p:pic>
+      <p:cxnSp>
+        <p:nvCxnSpPr>
+          <p:cNvPr id="55" name="Conector recto 54">
+            <a:extLst>
+              <a:ext uri="{FF2B5EF4-FFF2-40B4-BE49-F238E27FC236}">
+                <a16:creationId xmlns:a16="http://schemas.microsoft.com/office/drawing/2014/main" id="{8EF152B4-FB26-49E5-B0A1-F9EAD9ADC745}"/>
+              </a:ext>
+            </a:extLst>
+          </p:cNvPr>
+          <p:cNvCxnSpPr/>
+          <p:nvPr/>
+        </p:nvCxnSpPr>
+        <p:spPr>
+          <a:xfrm>
+            <a:off x="3624552" y="4320699"/>
+            <a:ext cx="801403" cy="0"/>
+          </a:xfrm>
+          <a:prstGeom prst="line">
+            <a:avLst/>
+          </a:prstGeom>
+          <a:ln w="19050">
+            <a:solidFill>
+              <a:srgbClr val="428479"/>
+            </a:solidFill>
+          </a:ln>
+        </p:spPr>
+        <p:style>
+          <a:lnRef idx="1">
+            <a:schemeClr val="accent1"/>
+          </a:lnRef>
+          <a:fillRef idx="0">
+            <a:schemeClr val="accent1"/>
+          </a:fillRef>
+          <a:effectRef idx="0">
+            <a:schemeClr val="accent1"/>
+          </a:effectRef>
+          <a:fontRef idx="minor">
+            <a:schemeClr val="tx1"/>
+          </a:fontRef>
+        </p:style>
+      </p:cxnSp>
+      <p:cxnSp>
+        <p:nvCxnSpPr>
+          <p:cNvPr id="59" name="Conector recto 58">
+            <a:extLst>
+              <a:ext uri="{FF2B5EF4-FFF2-40B4-BE49-F238E27FC236}">
+                <a16:creationId xmlns:a16="http://schemas.microsoft.com/office/drawing/2014/main" id="{5B8A0979-89E6-4CC2-8ADC-DBF4B4A41F13}"/>
+              </a:ext>
+            </a:extLst>
+          </p:cNvPr>
+          <p:cNvCxnSpPr/>
+          <p:nvPr/>
+        </p:nvCxnSpPr>
+        <p:spPr>
+          <a:xfrm>
+            <a:off x="7680329" y="4320699"/>
+            <a:ext cx="468000" cy="0"/>
+          </a:xfrm>
+          <a:prstGeom prst="line">
+            <a:avLst/>
+          </a:prstGeom>
+          <a:ln w="19050">
+            <a:solidFill>
+              <a:srgbClr val="428479"/>
+            </a:solidFill>
+          </a:ln>
+        </p:spPr>
+        <p:style>
+          <a:lnRef idx="1">
+            <a:schemeClr val="accent1"/>
+          </a:lnRef>
+          <a:fillRef idx="0">
+            <a:schemeClr val="accent1"/>
+          </a:fillRef>
+          <a:effectRef idx="0">
+            <a:schemeClr val="accent1"/>
+          </a:effectRef>
+          <a:fontRef idx="minor">
+            <a:schemeClr val="tx1"/>
+          </a:fontRef>
+        </p:style>
+      </p:cxnSp>
+      <p:cxnSp>
+        <p:nvCxnSpPr>
+          <p:cNvPr id="5" name="Conector recto 4">
+            <a:extLst>
+              <a:ext uri="{FF2B5EF4-FFF2-40B4-BE49-F238E27FC236}">
+                <a16:creationId xmlns:a16="http://schemas.microsoft.com/office/drawing/2014/main" id="{F2D939EB-6288-44DB-B576-9416723FAFFD}"/>
+              </a:ext>
+            </a:extLst>
+          </p:cNvPr>
+          <p:cNvCxnSpPr>
+            <a:cxnSpLocks/>
+            <a:stCxn id="4" idx="6"/>
+          </p:cNvCxnSpPr>
+          <p:nvPr/>
+        </p:nvCxnSpPr>
+        <p:spPr>
+          <a:xfrm>
+            <a:off x="4567734" y="4311174"/>
+            <a:ext cx="3047612" cy="1272"/>
+          </a:xfrm>
+          <a:prstGeom prst="line">
+            <a:avLst/>
+          </a:prstGeom>
+          <a:ln w="38100">
+            <a:solidFill>
+              <a:srgbClr val="428479"/>
+            </a:solidFill>
+          </a:ln>
+        </p:spPr>
+        <p:style>
+          <a:lnRef idx="1">
+            <a:schemeClr val="accent1"/>
+          </a:lnRef>
+          <a:fillRef idx="0">
+            <a:schemeClr val="accent1"/>
+          </a:fillRef>
+          <a:effectRef idx="0">
+            <a:schemeClr val="accent1"/>
+          </a:effectRef>
+          <a:fontRef idx="minor">
+            <a:schemeClr val="tx1"/>
+          </a:fontRef>
+        </p:style>
+      </p:cxnSp>
+      <p:cxnSp>
+        <p:nvCxnSpPr>
+          <p:cNvPr id="13" name="Conector recto 12">
+            <a:extLst>
+              <a:ext uri="{FF2B5EF4-FFF2-40B4-BE49-F238E27FC236}">
+                <a16:creationId xmlns:a16="http://schemas.microsoft.com/office/drawing/2014/main" id="{18EA2F74-30A9-46E7-8273-3DC30763DE4F}"/>
+              </a:ext>
+            </a:extLst>
+          </p:cNvPr>
+          <p:cNvCxnSpPr>
+            <a:cxnSpLocks/>
+            <a:endCxn id="46" idx="2"/>
+          </p:cNvCxnSpPr>
+          <p:nvPr/>
+        </p:nvCxnSpPr>
+        <p:spPr>
+          <a:xfrm flipV="1">
+            <a:off x="5076825" y="3936723"/>
+            <a:ext cx="1910222" cy="2976"/>
+          </a:xfrm>
+          <a:prstGeom prst="line">
+            <a:avLst/>
+          </a:prstGeom>
+          <a:ln w="38100">
+            <a:solidFill>
+              <a:schemeClr val="accent1"/>
+            </a:solidFill>
+          </a:ln>
+        </p:spPr>
+        <p:style>
+          <a:lnRef idx="1">
+            <a:schemeClr val="accent1"/>
+          </a:lnRef>
+          <a:fillRef idx="0">
+            <a:schemeClr val="accent1"/>
+          </a:fillRef>
+          <a:effectRef idx="0">
+            <a:schemeClr val="accent1"/>
+          </a:effectRef>
+          <a:fontRef idx="minor">
+            <a:schemeClr val="tx1"/>
+          </a:fontRef>
+        </p:style>
+      </p:cxnSp>
+      <p:cxnSp>
+        <p:nvCxnSpPr>
+          <p:cNvPr id="14" name="Conector recto 13">
+            <a:extLst>
+              <a:ext uri="{FF2B5EF4-FFF2-40B4-BE49-F238E27FC236}">
+                <a16:creationId xmlns:a16="http://schemas.microsoft.com/office/drawing/2014/main" id="{7D985ACF-4A1B-47B2-A59E-91A175778F6A}"/>
+              </a:ext>
+            </a:extLst>
+          </p:cNvPr>
+          <p:cNvCxnSpPr>
+            <a:cxnSpLocks/>
+            <a:stCxn id="4" idx="7"/>
+            <a:endCxn id="27" idx="2"/>
+          </p:cNvCxnSpPr>
+          <p:nvPr/>
+        </p:nvCxnSpPr>
+        <p:spPr>
+          <a:xfrm flipV="1">
+            <a:off x="4546646" y="3939835"/>
+            <a:ext cx="530179" cy="320427"/>
+          </a:xfrm>
+          <a:prstGeom prst="line">
+            <a:avLst/>
+          </a:prstGeom>
+          <a:ln w="38100">
+            <a:solidFill>
+              <a:schemeClr val="accent1"/>
+            </a:solidFill>
+          </a:ln>
+        </p:spPr>
+        <p:style>
+          <a:lnRef idx="1">
+            <a:schemeClr val="accent1"/>
+          </a:lnRef>
+          <a:fillRef idx="0">
+            <a:schemeClr val="accent1"/>
+          </a:fillRef>
+          <a:effectRef idx="0">
+            <a:schemeClr val="accent1"/>
+          </a:effectRef>
+          <a:fontRef idx="minor">
+            <a:schemeClr val="tx1"/>
+          </a:fontRef>
+        </p:style>
+      </p:cxnSp>
+      <p:sp>
+        <p:nvSpPr>
+          <p:cNvPr id="27" name="Elipse 26">
+            <a:extLst>
+              <a:ext uri="{FF2B5EF4-FFF2-40B4-BE49-F238E27FC236}">
+                <a16:creationId xmlns:a16="http://schemas.microsoft.com/office/drawing/2014/main" id="{E96BF921-A172-42C7-9D64-A5EAE60665A8}"/>
+              </a:ext>
+            </a:extLst>
+          </p:cNvPr>
+          <p:cNvSpPr/>
+          <p:nvPr/>
+        </p:nvSpPr>
+        <p:spPr>
+          <a:xfrm>
+            <a:off x="5076825" y="3885835"/>
+            <a:ext cx="108000" cy="108000"/>
+          </a:xfrm>
+          <a:prstGeom prst="ellipse">
+            <a:avLst/>
+          </a:prstGeom>
+          <a:solidFill>
+            <a:schemeClr val="accent5">
+              <a:lumMod val="60000"/>
+              <a:lumOff val="40000"/>
+            </a:schemeClr>
+          </a:solidFill>
+          <a:ln>
+            <a:solidFill>
+              <a:srgbClr val="0070C0"/>
+            </a:solidFill>
+          </a:ln>
+        </p:spPr>
+        <p:style>
+          <a:lnRef idx="2">
+            <a:schemeClr val="accent1">
+              <a:shade val="50000"/>
+            </a:schemeClr>
+          </a:lnRef>
+          <a:fillRef idx="1">
+            <a:schemeClr val="accent1"/>
+          </a:fillRef>
+          <a:effectRef idx="0">
+            <a:schemeClr val="accent1"/>
+          </a:effectRef>
+          <a:fontRef idx="minor">
+            <a:schemeClr val="lt1"/>
+          </a:fontRef>
+        </p:style>
+        <p:txBody>
+          <a:bodyPr rtlCol="0" anchor="ctr"/>
+          <a:lstStyle/>
+          <a:p>
+            <a:pPr algn="ctr"/>
+            <a:endParaRPr lang="es-ES"/>
+          </a:p>
+        </p:txBody>
+      </p:sp>
+      <p:sp>
+        <p:nvSpPr>
+          <p:cNvPr id="28" name="Elipse 27">
+            <a:extLst>
+              <a:ext uri="{FF2B5EF4-FFF2-40B4-BE49-F238E27FC236}">
+                <a16:creationId xmlns:a16="http://schemas.microsoft.com/office/drawing/2014/main" id="{D5F66B02-563E-4D17-8A77-7593C5DAA88C}"/>
+              </a:ext>
+            </a:extLst>
+          </p:cNvPr>
+          <p:cNvSpPr/>
+          <p:nvPr/>
+        </p:nvSpPr>
+        <p:spPr>
+          <a:xfrm>
+            <a:off x="7569154" y="4260262"/>
+            <a:ext cx="108000" cy="108000"/>
+          </a:xfrm>
+          <a:prstGeom prst="ellipse">
+            <a:avLst/>
+          </a:prstGeom>
+          <a:solidFill>
+            <a:schemeClr val="accent6">
+              <a:lumMod val="75000"/>
+            </a:schemeClr>
+          </a:solidFill>
+          <a:ln>
+            <a:solidFill>
+              <a:schemeClr val="accent6">
+                <a:lumMod val="60000"/>
+                <a:lumOff val="40000"/>
+              </a:schemeClr>
+            </a:solidFill>
+          </a:ln>
+        </p:spPr>
+        <p:style>
+          <a:lnRef idx="2">
+            <a:schemeClr val="accent1">
+              <a:shade val="50000"/>
+            </a:schemeClr>
+          </a:lnRef>
+          <a:fillRef idx="1">
+            <a:schemeClr val="accent1"/>
+          </a:fillRef>
+          <a:effectRef idx="0">
+            <a:schemeClr val="accent1"/>
+          </a:effectRef>
+          <a:fontRef idx="minor">
+            <a:schemeClr val="lt1"/>
+          </a:fontRef>
+        </p:style>
+        <p:txBody>
+          <a:bodyPr rtlCol="0" anchor="ctr"/>
+          <a:lstStyle/>
+          <a:p>
+            <a:pPr algn="ctr"/>
+            <a:endParaRPr lang="es-ES"/>
+          </a:p>
+        </p:txBody>
+      </p:sp>
+      <p:sp>
+        <p:nvSpPr>
+          <p:cNvPr id="40" name="CuadroTexto 39">
+            <a:extLst>
+              <a:ext uri="{FF2B5EF4-FFF2-40B4-BE49-F238E27FC236}">
+                <a16:creationId xmlns:a16="http://schemas.microsoft.com/office/drawing/2014/main" id="{BC391A74-93B0-4394-A365-B0074DB473D3}"/>
+              </a:ext>
+            </a:extLst>
+          </p:cNvPr>
+          <p:cNvSpPr txBox="1"/>
+          <p:nvPr/>
+        </p:nvSpPr>
+        <p:spPr>
+          <a:xfrm>
+            <a:off x="6873646" y="352425"/>
+            <a:ext cx="2689454" cy="369332"/>
+          </a:xfrm>
+          <a:prstGeom prst="rect">
+            <a:avLst/>
+          </a:prstGeom>
+          <a:noFill/>
+        </p:spPr>
+        <p:txBody>
+          <a:bodyPr wrap="none" rtlCol="0">
+            <a:spAutoFit/>
+          </a:bodyPr>
+          <a:lstStyle/>
+          <a:p>
+            <a:r>
+              <a:rPr lang="es-ES"/>
+              <a:t>Transporte urbano de Rubí</a:t>
+            </a:r>
+          </a:p>
+        </p:txBody>
+      </p:sp>
+      <p:cxnSp>
+        <p:nvCxnSpPr>
+          <p:cNvPr id="45" name="Conector recto 44">
+            <a:extLst>
+              <a:ext uri="{FF2B5EF4-FFF2-40B4-BE49-F238E27FC236}">
+                <a16:creationId xmlns:a16="http://schemas.microsoft.com/office/drawing/2014/main" id="{1CC32BA5-3B8B-4E7D-BA1B-74CF334AEBB1}"/>
+              </a:ext>
+            </a:extLst>
+          </p:cNvPr>
+          <p:cNvCxnSpPr>
+            <a:cxnSpLocks/>
+            <a:stCxn id="28" idx="1"/>
+            <a:endCxn id="46" idx="6"/>
+          </p:cNvCxnSpPr>
+          <p:nvPr/>
+        </p:nvCxnSpPr>
+        <p:spPr>
+          <a:xfrm flipH="1" flipV="1">
+            <a:off x="7095047" y="3936723"/>
+            <a:ext cx="489923" cy="339355"/>
+          </a:xfrm>
+          <a:prstGeom prst="line">
+            <a:avLst/>
+          </a:prstGeom>
+          <a:ln w="38100">
+            <a:solidFill>
+              <a:schemeClr val="accent1"/>
+            </a:solidFill>
+          </a:ln>
+        </p:spPr>
+        <p:style>
+          <a:lnRef idx="1">
+            <a:schemeClr val="accent1"/>
+          </a:lnRef>
+          <a:fillRef idx="0">
+            <a:schemeClr val="accent1"/>
+          </a:fillRef>
+          <a:effectRef idx="0">
+            <a:schemeClr val="accent1"/>
+          </a:effectRef>
+          <a:fontRef idx="minor">
+            <a:schemeClr val="tx1"/>
+          </a:fontRef>
+        </p:style>
+      </p:cxnSp>
+      <p:sp>
+        <p:nvSpPr>
+          <p:cNvPr id="46" name="Elipse 45">
+            <a:extLst>
+              <a:ext uri="{FF2B5EF4-FFF2-40B4-BE49-F238E27FC236}">
+                <a16:creationId xmlns:a16="http://schemas.microsoft.com/office/drawing/2014/main" id="{E96BAD64-012C-4C71-8245-503DBEA2F866}"/>
+              </a:ext>
+            </a:extLst>
+          </p:cNvPr>
+          <p:cNvSpPr/>
+          <p:nvPr/>
+        </p:nvSpPr>
+        <p:spPr>
+          <a:xfrm>
+            <a:off x="6987047" y="3882723"/>
+            <a:ext cx="108000" cy="108000"/>
+          </a:xfrm>
+          <a:prstGeom prst="ellipse">
+            <a:avLst/>
+          </a:prstGeom>
+          <a:solidFill>
+            <a:schemeClr val="accent5">
+              <a:lumMod val="60000"/>
+              <a:lumOff val="40000"/>
+            </a:schemeClr>
+          </a:solidFill>
+          <a:ln>
+            <a:solidFill>
+              <a:srgbClr val="0070C0"/>
+            </a:solidFill>
+          </a:ln>
+        </p:spPr>
+        <p:style>
+          <a:lnRef idx="2">
+            <a:schemeClr val="accent1">
+              <a:shade val="50000"/>
+            </a:schemeClr>
+          </a:lnRef>
+          <a:fillRef idx="1">
+            <a:schemeClr val="accent1"/>
+          </a:fillRef>
+          <a:effectRef idx="0">
+            <a:schemeClr val="accent1"/>
+          </a:effectRef>
+          <a:fontRef idx="minor">
+            <a:schemeClr val="lt1"/>
+          </a:fontRef>
+        </p:style>
+        <p:txBody>
+          <a:bodyPr rtlCol="0" anchor="ctr"/>
+          <a:lstStyle/>
+          <a:p>
+            <a:pPr algn="ctr"/>
+            <a:endParaRPr lang="es-ES"/>
+          </a:p>
+        </p:txBody>
+      </p:sp>
+      <p:cxnSp>
+        <p:nvCxnSpPr>
+          <p:cNvPr id="54" name="Conector recto 53">
+            <a:extLst>
+              <a:ext uri="{FF2B5EF4-FFF2-40B4-BE49-F238E27FC236}">
+                <a16:creationId xmlns:a16="http://schemas.microsoft.com/office/drawing/2014/main" id="{9ABE7EDF-F0E8-44E4-8F11-2E4B68A91541}"/>
+              </a:ext>
+            </a:extLst>
+          </p:cNvPr>
+          <p:cNvCxnSpPr/>
+          <p:nvPr/>
+        </p:nvCxnSpPr>
+        <p:spPr>
+          <a:xfrm>
+            <a:off x="3624552" y="4301649"/>
+            <a:ext cx="801403" cy="0"/>
+          </a:xfrm>
+          <a:prstGeom prst="line">
+            <a:avLst/>
+          </a:prstGeom>
+          <a:ln w="19050">
+            <a:solidFill>
+              <a:schemeClr val="accent1"/>
+            </a:solidFill>
+          </a:ln>
+        </p:spPr>
+        <p:style>
+          <a:lnRef idx="1">
+            <a:schemeClr val="accent1"/>
+          </a:lnRef>
+          <a:fillRef idx="0">
+            <a:schemeClr val="accent1"/>
+          </a:fillRef>
+          <a:effectRef idx="0">
+            <a:schemeClr val="accent1"/>
+          </a:effectRef>
+          <a:fontRef idx="minor">
+            <a:schemeClr val="tx1"/>
+          </a:fontRef>
+        </p:style>
+      </p:cxnSp>
+      <p:sp>
+        <p:nvSpPr>
+          <p:cNvPr id="4" name="Elipse 3">
+            <a:extLst>
+              <a:ext uri="{FF2B5EF4-FFF2-40B4-BE49-F238E27FC236}">
+                <a16:creationId xmlns:a16="http://schemas.microsoft.com/office/drawing/2014/main" id="{9236991A-A978-42AF-830A-DE2C1D52F5E6}"/>
+              </a:ext>
+            </a:extLst>
+          </p:cNvPr>
+          <p:cNvSpPr/>
+          <p:nvPr/>
+        </p:nvSpPr>
+        <p:spPr>
+          <a:xfrm>
+            <a:off x="4423734" y="4239174"/>
+            <a:ext cx="144000" cy="144000"/>
+          </a:xfrm>
+          <a:prstGeom prst="ellipse">
+            <a:avLst/>
+          </a:prstGeom>
+          <a:solidFill>
+            <a:schemeClr val="accent4">
+              <a:lumMod val="60000"/>
+              <a:lumOff val="40000"/>
+            </a:schemeClr>
+          </a:solidFill>
+        </p:spPr>
+        <p:style>
+          <a:lnRef idx="2">
+            <a:schemeClr val="accent1">
+              <a:shade val="50000"/>
+            </a:schemeClr>
+          </a:lnRef>
+          <a:fillRef idx="1">
+            <a:schemeClr val="accent1"/>
+          </a:fillRef>
+          <a:effectRef idx="0">
+            <a:schemeClr val="accent1"/>
+          </a:effectRef>
+          <a:fontRef idx="minor">
+            <a:schemeClr val="lt1"/>
+          </a:fontRef>
+        </p:style>
+        <p:txBody>
+          <a:bodyPr rtlCol="0" anchor="ctr"/>
+          <a:lstStyle/>
+          <a:p>
+            <a:pPr algn="ctr"/>
+            <a:endParaRPr lang="es-ES"/>
+          </a:p>
+        </p:txBody>
+      </p:sp>
+      <p:sp>
+        <p:nvSpPr>
+          <p:cNvPr id="38" name="Elipse 37">
+            <a:extLst>
+              <a:ext uri="{FF2B5EF4-FFF2-40B4-BE49-F238E27FC236}">
+                <a16:creationId xmlns:a16="http://schemas.microsoft.com/office/drawing/2014/main" id="{A05398E5-AA1C-44C5-8F21-66E6D7B710B2}"/>
+              </a:ext>
+            </a:extLst>
+          </p:cNvPr>
+          <p:cNvSpPr/>
+          <p:nvPr/>
+        </p:nvSpPr>
+        <p:spPr>
+          <a:xfrm>
+            <a:off x="3479065" y="4239174"/>
+            <a:ext cx="144000" cy="144000"/>
+          </a:xfrm>
+          <a:prstGeom prst="ellipse">
+            <a:avLst/>
+          </a:prstGeom>
+          <a:solidFill>
+            <a:schemeClr val="accent4">
+              <a:lumMod val="60000"/>
+              <a:lumOff val="40000"/>
+            </a:schemeClr>
+          </a:solidFill>
+        </p:spPr>
+        <p:style>
+          <a:lnRef idx="2">
+            <a:schemeClr val="accent1">
+              <a:shade val="50000"/>
+            </a:schemeClr>
+          </a:lnRef>
+          <a:fillRef idx="1">
+            <a:schemeClr val="accent1"/>
+          </a:fillRef>
+          <a:effectRef idx="0">
+            <a:schemeClr val="accent1"/>
+          </a:effectRef>
+          <a:fontRef idx="minor">
+            <a:schemeClr val="lt1"/>
+          </a:fontRef>
+        </p:style>
+        <p:txBody>
+          <a:bodyPr rtlCol="0" anchor="ctr"/>
+          <a:lstStyle/>
+          <a:p>
+            <a:pPr algn="ctr"/>
+            <a:endParaRPr lang="es-ES"/>
+          </a:p>
+        </p:txBody>
+      </p:sp>
+      <p:cxnSp>
+        <p:nvCxnSpPr>
+          <p:cNvPr id="58" name="Conector recto 57">
+            <a:extLst>
+              <a:ext uri="{FF2B5EF4-FFF2-40B4-BE49-F238E27FC236}">
+                <a16:creationId xmlns:a16="http://schemas.microsoft.com/office/drawing/2014/main" id="{15525BA1-0F25-483A-9CEA-C13F90B36C09}"/>
+              </a:ext>
+            </a:extLst>
+          </p:cNvPr>
+          <p:cNvCxnSpPr/>
+          <p:nvPr/>
+        </p:nvCxnSpPr>
+        <p:spPr>
+          <a:xfrm>
+            <a:off x="7680329" y="4301649"/>
+            <a:ext cx="468000" cy="0"/>
+          </a:xfrm>
+          <a:prstGeom prst="line">
+            <a:avLst/>
+          </a:prstGeom>
+          <a:ln w="19050">
+            <a:solidFill>
+              <a:schemeClr val="accent1"/>
+            </a:solidFill>
+          </a:ln>
+        </p:spPr>
+        <p:style>
+          <a:lnRef idx="1">
+            <a:schemeClr val="accent1"/>
+          </a:lnRef>
+          <a:fillRef idx="0">
+            <a:schemeClr val="accent1"/>
+          </a:fillRef>
+          <a:effectRef idx="0">
+            <a:schemeClr val="accent1"/>
+          </a:effectRef>
+          <a:fontRef idx="minor">
+            <a:schemeClr val="tx1"/>
+          </a:fontRef>
+        </p:style>
+      </p:cxnSp>
+      <p:sp>
+        <p:nvSpPr>
+          <p:cNvPr id="10" name="Elipse 9">
+            <a:extLst>
+              <a:ext uri="{FF2B5EF4-FFF2-40B4-BE49-F238E27FC236}">
+                <a16:creationId xmlns:a16="http://schemas.microsoft.com/office/drawing/2014/main" id="{6CAA1851-E736-427E-891B-8B5F3C9E19B1}"/>
+              </a:ext>
+            </a:extLst>
+          </p:cNvPr>
+          <p:cNvSpPr/>
+          <p:nvPr/>
+        </p:nvSpPr>
+        <p:spPr>
+          <a:xfrm>
+            <a:off x="8151249" y="4239174"/>
+            <a:ext cx="144000" cy="144000"/>
+          </a:xfrm>
+          <a:prstGeom prst="ellipse">
+            <a:avLst/>
+          </a:prstGeom>
+          <a:solidFill>
+            <a:schemeClr val="accent4">
+              <a:lumMod val="60000"/>
+              <a:lumOff val="40000"/>
+            </a:schemeClr>
+          </a:solidFill>
+        </p:spPr>
+        <p:style>
+          <a:lnRef idx="2">
+            <a:schemeClr val="accent1">
+              <a:shade val="50000"/>
+            </a:schemeClr>
+          </a:lnRef>
+          <a:fillRef idx="1">
+            <a:schemeClr val="accent1"/>
+          </a:fillRef>
+          <a:effectRef idx="0">
+            <a:schemeClr val="accent1"/>
+          </a:effectRef>
+          <a:fontRef idx="minor">
+            <a:schemeClr val="lt1"/>
+          </a:fontRef>
+        </p:style>
+        <p:txBody>
+          <a:bodyPr rtlCol="0" anchor="ctr"/>
+          <a:lstStyle/>
+          <a:p>
+            <a:pPr algn="ctr"/>
+            <a:endParaRPr lang="es-ES"/>
+          </a:p>
+        </p:txBody>
+      </p:sp>
+      <p:sp>
+        <p:nvSpPr>
+          <p:cNvPr id="68" name="Flecha: a la derecha 67">
+            <a:extLst>
+              <a:ext uri="{FF2B5EF4-FFF2-40B4-BE49-F238E27FC236}">
+                <a16:creationId xmlns:a16="http://schemas.microsoft.com/office/drawing/2014/main" id="{B4A64CB9-41B9-449A-88CA-44462C36F935}"/>
+              </a:ext>
+            </a:extLst>
+          </p:cNvPr>
+          <p:cNvSpPr/>
+          <p:nvPr/>
+        </p:nvSpPr>
+        <p:spPr>
+          <a:xfrm flipH="1">
+            <a:off x="5928877" y="3813414"/>
+            <a:ext cx="695362" cy="239700"/>
+          </a:xfrm>
+          <a:prstGeom prst="rightArrow">
+            <a:avLst>
+              <a:gd name="adj1" fmla="val 0"/>
+              <a:gd name="adj2" fmla="val 87181"/>
+            </a:avLst>
+          </a:prstGeom>
+          <a:solidFill>
+            <a:schemeClr val="accent5">
+              <a:lumMod val="60000"/>
+              <a:lumOff val="40000"/>
+            </a:schemeClr>
+          </a:solidFill>
+          <a:ln>
+            <a:solidFill>
+              <a:schemeClr val="accent1"/>
+            </a:solidFill>
+          </a:ln>
+        </p:spPr>
+        <p:style>
+          <a:lnRef idx="2">
+            <a:schemeClr val="accent1">
+              <a:shade val="50000"/>
+            </a:schemeClr>
+          </a:lnRef>
+          <a:fillRef idx="1">
+            <a:schemeClr val="accent1"/>
+          </a:fillRef>
+          <a:effectRef idx="0">
+            <a:schemeClr val="accent1"/>
+          </a:effectRef>
+          <a:fontRef idx="minor">
+            <a:schemeClr val="lt1"/>
+          </a:fontRef>
+        </p:style>
+        <p:txBody>
+          <a:bodyPr rtlCol="0" anchor="ctr"/>
+          <a:lstStyle/>
+          <a:p>
+            <a:pPr algn="ctr"/>
+            <a:endParaRPr lang="es-ES"/>
+          </a:p>
+        </p:txBody>
+      </p:sp>
+      <p:sp>
+        <p:nvSpPr>
+          <p:cNvPr id="66" name="Flecha: a la derecha 65">
+            <a:extLst>
+              <a:ext uri="{FF2B5EF4-FFF2-40B4-BE49-F238E27FC236}">
+                <a16:creationId xmlns:a16="http://schemas.microsoft.com/office/drawing/2014/main" id="{CE05AE11-3C62-4D6C-8359-1A225B5D9EC6}"/>
+              </a:ext>
+            </a:extLst>
+          </p:cNvPr>
+          <p:cNvSpPr/>
+          <p:nvPr/>
+        </p:nvSpPr>
+        <p:spPr>
+          <a:xfrm>
+            <a:off x="4849280" y="4191324"/>
+            <a:ext cx="695362" cy="239700"/>
+          </a:xfrm>
+          <a:prstGeom prst="rightArrow">
+            <a:avLst>
+              <a:gd name="adj1" fmla="val 0"/>
+              <a:gd name="adj2" fmla="val 87181"/>
+            </a:avLst>
+          </a:prstGeom>
+          <a:solidFill>
+            <a:schemeClr val="accent6">
+              <a:lumMod val="75000"/>
+            </a:schemeClr>
+          </a:solidFill>
+          <a:ln>
+            <a:solidFill>
+              <a:srgbClr val="428479"/>
+            </a:solidFill>
+          </a:ln>
+        </p:spPr>
+        <p:style>
+          <a:lnRef idx="2">
+            <a:schemeClr val="accent1">
+              <a:shade val="50000"/>
+            </a:schemeClr>
+          </a:lnRef>
+          <a:fillRef idx="1">
+            <a:schemeClr val="accent1"/>
+          </a:fillRef>
+          <a:effectRef idx="0">
+            <a:schemeClr val="accent1"/>
+          </a:effectRef>
+          <a:fontRef idx="minor">
+            <a:schemeClr val="lt1"/>
+          </a:fontRef>
+        </p:style>
+        <p:txBody>
+          <a:bodyPr rtlCol="0" anchor="ctr"/>
+          <a:lstStyle/>
+          <a:p>
+            <a:pPr algn="ctr"/>
+            <a:endParaRPr lang="es-ES"/>
+          </a:p>
+        </p:txBody>
+      </p:sp>
+      <p:sp>
+        <p:nvSpPr>
+          <p:cNvPr id="67" name="Flecha: a la derecha 66">
+            <a:extLst>
+              <a:ext uri="{FF2B5EF4-FFF2-40B4-BE49-F238E27FC236}">
+                <a16:creationId xmlns:a16="http://schemas.microsoft.com/office/drawing/2014/main" id="{3A21C75D-25FB-461E-ADEA-E9739BE2935C}"/>
+              </a:ext>
+            </a:extLst>
+          </p:cNvPr>
+          <p:cNvSpPr/>
+          <p:nvPr/>
+        </p:nvSpPr>
+        <p:spPr>
+          <a:xfrm>
+            <a:off x="6205130" y="4191324"/>
+            <a:ext cx="695362" cy="239700"/>
+          </a:xfrm>
+          <a:prstGeom prst="rightArrow">
+            <a:avLst>
+              <a:gd name="adj1" fmla="val 0"/>
+              <a:gd name="adj2" fmla="val 87181"/>
+            </a:avLst>
+          </a:prstGeom>
+          <a:solidFill>
+            <a:schemeClr val="accent6">
+              <a:lumMod val="75000"/>
+            </a:schemeClr>
+          </a:solidFill>
+          <a:ln>
+            <a:solidFill>
+              <a:srgbClr val="428479"/>
+            </a:solidFill>
+          </a:ln>
+        </p:spPr>
+        <p:style>
+          <a:lnRef idx="2">
+            <a:schemeClr val="accent1">
+              <a:shade val="50000"/>
+            </a:schemeClr>
+          </a:lnRef>
+          <a:fillRef idx="1">
+            <a:schemeClr val="accent1"/>
+          </a:fillRef>
+          <a:effectRef idx="0">
+            <a:schemeClr val="accent1"/>
+          </a:effectRef>
+          <a:fontRef idx="minor">
+            <a:schemeClr val="lt1"/>
+          </a:fontRef>
+        </p:style>
+        <p:txBody>
+          <a:bodyPr rtlCol="0" anchor="ctr"/>
+          <a:lstStyle/>
+          <a:p>
+            <a:pPr algn="ctr"/>
+            <a:endParaRPr lang="es-ES"/>
+          </a:p>
+        </p:txBody>
+      </p:sp>
+    </p:spTree>
+    <p:extLst>
+      <p:ext uri="{BB962C8B-B14F-4D97-AF65-F5344CB8AC3E}">
+        <p14:creationId xmlns:p14="http://schemas.microsoft.com/office/powerpoint/2010/main" val="907766574"/>
       </p:ext>
     </p:extLst>
   </p:cSld>

</xml_diff>